<commit_message>
edit OOly in MapGUIForm java
</commit_message>
<xml_diff>
--- a/소공최종발표자료_컴퓨터과학부하경민도우찬.pptx
+++ b/소공최종발표자료_컴퓨터과학부하경민도우찬.pptx
@@ -5,43 +5,44 @@
     <p:sldMasterId id="2147483660" r:id="rId1"/>
   </p:sldMasterIdLst>
   <p:notesMasterIdLst>
-    <p:notesMasterId r:id="rId20"/>
+    <p:notesMasterId r:id="rId21"/>
   </p:notesMasterIdLst>
   <p:handoutMasterIdLst>
-    <p:handoutMasterId r:id="rId21"/>
+    <p:handoutMasterId r:id="rId22"/>
   </p:handoutMasterIdLst>
   <p:sldIdLst>
     <p:sldId id="257" r:id="rId2"/>
-    <p:sldId id="258" r:id="rId3"/>
-    <p:sldId id="282" r:id="rId4"/>
-    <p:sldId id="266" r:id="rId5"/>
-    <p:sldId id="290" r:id="rId6"/>
-    <p:sldId id="283" r:id="rId7"/>
-    <p:sldId id="289" r:id="rId8"/>
-    <p:sldId id="284" r:id="rId9"/>
-    <p:sldId id="285" r:id="rId10"/>
-    <p:sldId id="291" r:id="rId11"/>
-    <p:sldId id="293" r:id="rId12"/>
-    <p:sldId id="294" r:id="rId13"/>
-    <p:sldId id="299" r:id="rId14"/>
-    <p:sldId id="300" r:id="rId15"/>
-    <p:sldId id="298" r:id="rId16"/>
-    <p:sldId id="296" r:id="rId17"/>
-    <p:sldId id="297" r:id="rId18"/>
-    <p:sldId id="278" r:id="rId19"/>
+    <p:sldId id="301" r:id="rId3"/>
+    <p:sldId id="258" r:id="rId4"/>
+    <p:sldId id="282" r:id="rId5"/>
+    <p:sldId id="266" r:id="rId6"/>
+    <p:sldId id="290" r:id="rId7"/>
+    <p:sldId id="283" r:id="rId8"/>
+    <p:sldId id="289" r:id="rId9"/>
+    <p:sldId id="284" r:id="rId10"/>
+    <p:sldId id="285" r:id="rId11"/>
+    <p:sldId id="291" r:id="rId12"/>
+    <p:sldId id="293" r:id="rId13"/>
+    <p:sldId id="294" r:id="rId14"/>
+    <p:sldId id="299" r:id="rId15"/>
+    <p:sldId id="300" r:id="rId16"/>
+    <p:sldId id="298" r:id="rId17"/>
+    <p:sldId id="296" r:id="rId18"/>
+    <p:sldId id="297" r:id="rId19"/>
+    <p:sldId id="278" r:id="rId20"/>
   </p:sldIdLst>
   <p:sldSz cx="9144000" cy="6858000" type="screen4x3"/>
   <p:notesSz cx="6805613" cy="9939338"/>
   <p:embeddedFontLst>
     <p:embeddedFont>
-      <p:font typeface="나눔고딕" panose="020D0604000000000000" pitchFamily="50" charset="-127"/>
-      <p:regular r:id="rId22"/>
-      <p:bold r:id="rId23"/>
+      <p:font typeface="맑은 고딕" panose="020B0503020000020004" pitchFamily="50" charset="-127"/>
+      <p:regular r:id="rId23"/>
+      <p:bold r:id="rId24"/>
     </p:embeddedFont>
     <p:embeddedFont>
-      <p:font typeface="맑은 고딕" panose="020B0503020000020004" pitchFamily="50" charset="-127"/>
-      <p:regular r:id="rId24"/>
-      <p:bold r:id="rId25"/>
+      <p:font typeface="나눔고딕" panose="020D0604000000000000" pitchFamily="50" charset="-127"/>
+      <p:regular r:id="rId25"/>
+      <p:bold r:id="rId26"/>
     </p:embeddedFont>
   </p:embeddedFontLst>
   <p:defaultTextStyle>
@@ -325,7 +326,7 @@
             <a:fld id="{207F23D9-DF40-4811-9C78-A2E2A32398DD}" type="datetimeFigureOut">
               <a:rPr lang="ko-KR" altLang="en-US" smtClean="0"/>
               <a:pPr/>
-              <a:t>2019-11-08</a:t>
+              <a:t>2019-12-03</a:t>
             </a:fld>
             <a:endParaRPr lang="ko-KR" altLang="en-US"/>
           </a:p>
@@ -492,7 +493,7 @@
             <a:fld id="{F3AF6795-A612-454E-AF7A-9192B1BEBB13}" type="datetimeFigureOut">
               <a:rPr lang="ko-KR" altLang="en-US" smtClean="0"/>
               <a:pPr/>
-              <a:t>2019-11-08</a:t>
+              <a:t>2019-12-03</a:t>
             </a:fld>
             <a:endParaRPr lang="ko-KR" altLang="en-US"/>
           </a:p>
@@ -911,7 +912,7 @@
             <a:fld id="{A0A51D67-0C14-4576-BCC5-A508196B7BB5}" type="slidenum">
               <a:rPr lang="ko-KR" altLang="en-US" smtClean="0"/>
               <a:pPr/>
-              <a:t>3</a:t>
+              <a:t>4</a:t>
             </a:fld>
             <a:endParaRPr lang="ko-KR" altLang="en-US"/>
           </a:p>
@@ -998,7 +999,7 @@
             <a:fld id="{A0A51D67-0C14-4576-BCC5-A508196B7BB5}" type="slidenum">
               <a:rPr lang="ko-KR" altLang="en-US" smtClean="0"/>
               <a:pPr/>
-              <a:t>18</a:t>
+              <a:t>19</a:t>
             </a:fld>
             <a:endParaRPr lang="ko-KR" altLang="en-US"/>
           </a:p>
@@ -1512,7 +1513,7 @@
             <a:fld id="{8761FD00-3F21-42CF-9EF5-8F6D81CE3AFD}" type="datetimeFigureOut">
               <a:rPr lang="ko-KR" altLang="en-US" smtClean="0"/>
               <a:pPr/>
-              <a:t>2019-11-08</a:t>
+              <a:t>2019-12-03</a:t>
             </a:fld>
             <a:endParaRPr lang="ko-KR" altLang="en-US"/>
           </a:p>
@@ -2258,7 +2259,7 @@
             <a:fld id="{8761FD00-3F21-42CF-9EF5-8F6D81CE3AFD}" type="datetimeFigureOut">
               <a:rPr lang="ko-KR" altLang="en-US" smtClean="0"/>
               <a:pPr/>
-              <a:t>2019-11-08</a:t>
+              <a:t>2019-12-03</a:t>
             </a:fld>
             <a:endParaRPr lang="ko-KR" altLang="en-US"/>
           </a:p>
@@ -2571,7 +2572,7 @@
             <a:fld id="{8761FD00-3F21-42CF-9EF5-8F6D81CE3AFD}" type="datetimeFigureOut">
               <a:rPr lang="ko-KR" altLang="en-US" smtClean="0"/>
               <a:pPr/>
-              <a:t>2019-11-08</a:t>
+              <a:t>2019-12-03</a:t>
             </a:fld>
             <a:endParaRPr lang="ko-KR" altLang="en-US"/>
           </a:p>
@@ -2826,7 +2827,7 @@
             <a:fld id="{8761FD00-3F21-42CF-9EF5-8F6D81CE3AFD}" type="datetimeFigureOut">
               <a:rPr lang="ko-KR" altLang="en-US" smtClean="0"/>
               <a:pPr/>
-              <a:t>2019-11-08</a:t>
+              <a:t>2019-12-03</a:t>
             </a:fld>
             <a:endParaRPr lang="ko-KR" altLang="en-US"/>
           </a:p>
@@ -3052,7 +3053,7 @@
             <a:fld id="{8761FD00-3F21-42CF-9EF5-8F6D81CE3AFD}" type="datetimeFigureOut">
               <a:rPr lang="ko-KR" altLang="en-US" smtClean="0"/>
               <a:pPr/>
-              <a:t>2019-11-08</a:t>
+              <a:t>2019-12-03</a:t>
             </a:fld>
             <a:endParaRPr lang="ko-KR" altLang="en-US"/>
           </a:p>
@@ -3278,7 +3279,7 @@
             <a:fld id="{8761FD00-3F21-42CF-9EF5-8F6D81CE3AFD}" type="datetimeFigureOut">
               <a:rPr lang="ko-KR" altLang="en-US" smtClean="0"/>
               <a:pPr/>
-              <a:t>2019-11-08</a:t>
+              <a:t>2019-12-03</a:t>
             </a:fld>
             <a:endParaRPr lang="ko-KR" altLang="en-US"/>
           </a:p>
@@ -3759,7 +3760,17 @@
                   </a:schemeClr>
                 </a:solidFill>
               </a:rPr>
-              <a:t>시스템 설계 발표</a:t>
+              <a:t>시스템 </a:t>
+            </a:r>
+            <a:r>
+              <a:rPr lang="ko-KR" altLang="en-US" sz="5400" b="1" spc="-250" dirty="0" smtClean="0">
+                <a:solidFill>
+                  <a:schemeClr val="accent4">
+                    <a:lumMod val="50000"/>
+                  </a:schemeClr>
+                </a:solidFill>
+              </a:rPr>
+              <a:t>최종 발표</a:t>
             </a:r>
             <a:endParaRPr lang="ko-KR" altLang="en-US" sz="5400" b="1" spc="-250" dirty="0">
               <a:solidFill>
@@ -3814,8 +3825,18 @@
                 <a:latin typeface="나눔고딕" pitchFamily="50" charset="-127"/>
                 <a:ea typeface="나눔고딕" pitchFamily="50" charset="-127"/>
               </a:rPr>
-              <a:t>2019.11.08</a:t>
-            </a:r>
+              <a:t>2019.12.06</a:t>
+            </a:r>
+            <a:endParaRPr lang="en-US" altLang="ko-KR" sz="1200" b="1" spc="-50" dirty="0" smtClean="0">
+              <a:solidFill>
+                <a:schemeClr val="tx1">
+                  <a:lumMod val="75000"/>
+                  <a:lumOff val="25000"/>
+                </a:schemeClr>
+              </a:solidFill>
+              <a:latin typeface="나눔고딕" pitchFamily="50" charset="-127"/>
+              <a:ea typeface="나눔고딕" pitchFamily="50" charset="-127"/>
+            </a:endParaRPr>
           </a:p>
           <a:p>
             <a:pPr algn="l">
@@ -4175,10 +4196,10 @@
                 <a:latin typeface="나눔고딕" pitchFamily="50" charset="-127"/>
                 <a:ea typeface="나눔고딕" pitchFamily="50" charset="-127"/>
               </a:rPr>
-              <a:t>5. </a:t>
-            </a:r>
-            <a:r>
-              <a:rPr lang="ko-KR" altLang="en-US" sz="800" spc="-30" dirty="0" smtClean="0">
+              <a:t>4. </a:t>
+            </a:r>
+            <a:r>
+              <a:rPr lang="ko-KR" altLang="en-US" sz="800" spc="-30" dirty="0" err="1" smtClean="0">
                 <a:solidFill>
                   <a:schemeClr val="tx1">
                     <a:lumMod val="95000"/>
@@ -4188,7 +4209,7 @@
                 <a:latin typeface="나눔고딕" pitchFamily="50" charset="-127"/>
                 <a:ea typeface="나눔고딕" pitchFamily="50" charset="-127"/>
               </a:rPr>
-              <a:t>메인 클래스도</a:t>
+              <a:t>아키텍쳐도</a:t>
             </a:r>
             <a:endParaRPr lang="en-US" altLang="ko-KR" sz="800" spc="-30" dirty="0" smtClean="0">
               <a:solidFill>
@@ -4325,12 +4346,12 @@
           <a:p>
             <a:pPr algn="l"/>
             <a:r>
-              <a:rPr lang="ko-KR" altLang="en-US" sz="4000" b="1" spc="-150" dirty="0" smtClean="0">
+              <a:rPr lang="ko-KR" altLang="en-US" sz="4000" b="1" spc="-150" dirty="0" err="1" smtClean="0">
                 <a:solidFill>
                   <a:srgbClr val="1D314E"/>
                 </a:solidFill>
               </a:rPr>
-              <a:t>메인 클래스도</a:t>
+              <a:t>아키텍쳐도</a:t>
             </a:r>
             <a:endParaRPr lang="ko-KR" altLang="en-US" sz="4000" b="1" spc="-150" dirty="0">
               <a:solidFill>
@@ -4362,8 +4383,8 @@
         </p:blipFill>
         <p:spPr>
           <a:xfrm>
-            <a:off x="1163132" y="1408112"/>
-            <a:ext cx="6644857" cy="5333440"/>
+            <a:off x="1514318" y="2530429"/>
+            <a:ext cx="6115364" cy="1797142"/>
           </a:xfrm>
           <a:prstGeom prst="rect">
             <a:avLst/>
@@ -4373,7 +4394,7 @@
     </p:spTree>
     <p:extLst>
       <p:ext uri="{BB962C8B-B14F-4D97-AF65-F5344CB8AC3E}">
-        <p14:creationId xmlns:p14="http://schemas.microsoft.com/office/powerpoint/2010/main" val="1713547521"/>
+        <p14:creationId xmlns:p14="http://schemas.microsoft.com/office/powerpoint/2010/main" val="1212484014"/>
       </p:ext>
     </p:extLst>
   </p:cSld>
@@ -4440,10 +4461,10 @@
                 <a:latin typeface="나눔고딕" pitchFamily="50" charset="-127"/>
                 <a:ea typeface="나눔고딕" pitchFamily="50" charset="-127"/>
               </a:rPr>
-              <a:t>2. </a:t>
-            </a:r>
-            <a:r>
-              <a:rPr lang="ko-KR" altLang="en-US" sz="800" spc="-30" dirty="0" err="1" smtClean="0">
+              <a:t>5. </a:t>
+            </a:r>
+            <a:r>
+              <a:rPr lang="ko-KR" altLang="en-US" sz="800" spc="-30" dirty="0" smtClean="0">
                 <a:solidFill>
                   <a:schemeClr val="tx1">
                     <a:lumMod val="95000"/>
@@ -4453,20 +4474,7 @@
                 <a:latin typeface="나눔고딕" pitchFamily="50" charset="-127"/>
                 <a:ea typeface="나눔고딕" pitchFamily="50" charset="-127"/>
               </a:rPr>
-              <a:t>유즈케이스도와</a:t>
-            </a:r>
-            <a:r>
-              <a:rPr lang="ko-KR" altLang="en-US" sz="800" spc="-30" dirty="0" smtClean="0">
-                <a:solidFill>
-                  <a:schemeClr val="tx1">
-                    <a:lumMod val="95000"/>
-                    <a:lumOff val="5000"/>
-                  </a:schemeClr>
-                </a:solidFill>
-                <a:latin typeface="나눔고딕" pitchFamily="50" charset="-127"/>
-                <a:ea typeface="나눔고딕" pitchFamily="50" charset="-127"/>
-              </a:rPr>
-              <a:t> 설명</a:t>
+              <a:t>메인 클래스도</a:t>
             </a:r>
             <a:endParaRPr lang="en-US" altLang="ko-KR" sz="800" spc="-30" dirty="0" smtClean="0">
               <a:solidFill>
@@ -4603,20 +4611,12 @@
           <a:p>
             <a:pPr algn="l"/>
             <a:r>
-              <a:rPr lang="en-US" altLang="ko-KR" sz="4000" b="1" spc="-150" dirty="0" smtClean="0">
+              <a:rPr lang="ko-KR" altLang="en-US" sz="4000" b="1" spc="-150" dirty="0" smtClean="0">
                 <a:solidFill>
                   <a:srgbClr val="1D314E"/>
                 </a:solidFill>
               </a:rPr>
-              <a:t>“Input Map Data” </a:t>
-            </a:r>
-            <a:r>
-              <a:rPr lang="ko-KR" altLang="en-US" sz="4000" b="1" spc="-150" dirty="0" smtClean="0">
-                <a:solidFill>
-                  <a:srgbClr val="1D314E"/>
-                </a:solidFill>
-              </a:rPr>
-              <a:t>순차도</a:t>
+              <a:t>메인 클래스도</a:t>
             </a:r>
             <a:endParaRPr lang="ko-KR" altLang="en-US" sz="4000" b="1" spc="-150" dirty="0">
               <a:solidFill>
@@ -4628,7 +4628,7 @@
       </p:sp>
       <p:pic>
         <p:nvPicPr>
-          <p:cNvPr id="3" name="그림 2"/>
+          <p:cNvPr id="2" name="그림 1"/>
           <p:cNvPicPr>
             <a:picLocks noChangeAspect="1"/>
           </p:cNvPicPr>
@@ -4648,8 +4648,8 @@
         </p:blipFill>
         <p:spPr>
           <a:xfrm>
-            <a:off x="936173" y="1376752"/>
-            <a:ext cx="7331755" cy="5481248"/>
+            <a:off x="1163132" y="1408112"/>
+            <a:ext cx="6644857" cy="5333440"/>
           </a:xfrm>
           <a:prstGeom prst="rect">
             <a:avLst/>
@@ -4659,7 +4659,7 @@
     </p:spTree>
     <p:extLst>
       <p:ext uri="{BB962C8B-B14F-4D97-AF65-F5344CB8AC3E}">
-        <p14:creationId xmlns:p14="http://schemas.microsoft.com/office/powerpoint/2010/main" val="1351778396"/>
+        <p14:creationId xmlns:p14="http://schemas.microsoft.com/office/powerpoint/2010/main" val="1713547521"/>
       </p:ext>
     </p:extLst>
   </p:cSld>
@@ -4894,7 +4894,7 @@
                   <a:srgbClr val="1D314E"/>
                 </a:solidFill>
               </a:rPr>
-              <a:t>“Run Robot Searching”</a:t>
+              <a:t>“Input Map Data” </a:t>
             </a:r>
             <a:r>
               <a:rPr lang="ko-KR" altLang="en-US" sz="4000" b="1" spc="-150" dirty="0" smtClean="0">
@@ -4902,7 +4902,7 @@
                   <a:srgbClr val="1D314E"/>
                 </a:solidFill>
               </a:rPr>
-              <a:t> 순차도</a:t>
+              <a:t>순차도</a:t>
             </a:r>
             <a:endParaRPr lang="ko-KR" altLang="en-US" sz="4000" b="1" spc="-150" dirty="0">
               <a:solidFill>
@@ -4914,7 +4914,7 @@
       </p:sp>
       <p:pic>
         <p:nvPicPr>
-          <p:cNvPr id="2" name="그림 1"/>
+          <p:cNvPr id="3" name="그림 2"/>
           <p:cNvPicPr>
             <a:picLocks noChangeAspect="1"/>
           </p:cNvPicPr>
@@ -4934,8 +4934,8 @@
         </p:blipFill>
         <p:spPr>
           <a:xfrm>
-            <a:off x="65421" y="1495551"/>
-            <a:ext cx="9004763" cy="3943553"/>
+            <a:off x="936173" y="1376752"/>
+            <a:ext cx="7331755" cy="5481248"/>
           </a:xfrm>
           <a:prstGeom prst="rect">
             <a:avLst/>
@@ -4945,7 +4945,7 @@
     </p:spTree>
     <p:extLst>
       <p:ext uri="{BB962C8B-B14F-4D97-AF65-F5344CB8AC3E}">
-        <p14:creationId xmlns:p14="http://schemas.microsoft.com/office/powerpoint/2010/main" val="658007233"/>
+        <p14:creationId xmlns:p14="http://schemas.microsoft.com/office/powerpoint/2010/main" val="1351778396"/>
       </p:ext>
     </p:extLst>
   </p:cSld>
@@ -5200,7 +5200,7 @@
       </p:sp>
       <p:pic>
         <p:nvPicPr>
-          <p:cNvPr id="3" name="그림 2"/>
+          <p:cNvPr id="2" name="그림 1"/>
           <p:cNvPicPr>
             <a:picLocks noChangeAspect="1"/>
           </p:cNvPicPr>
@@ -5220,8 +5220,8 @@
         </p:blipFill>
         <p:spPr>
           <a:xfrm>
-            <a:off x="95281" y="0"/>
-            <a:ext cx="8865831" cy="6858000"/>
+            <a:off x="65421" y="1495551"/>
+            <a:ext cx="9004763" cy="3943553"/>
           </a:xfrm>
           <a:prstGeom prst="rect">
             <a:avLst/>
@@ -5231,7 +5231,7 @@
     </p:spTree>
     <p:extLst>
       <p:ext uri="{BB962C8B-B14F-4D97-AF65-F5344CB8AC3E}">
-        <p14:creationId xmlns:p14="http://schemas.microsoft.com/office/powerpoint/2010/main" val="1618203320"/>
+        <p14:creationId xmlns:p14="http://schemas.microsoft.com/office/powerpoint/2010/main" val="658007233"/>
       </p:ext>
     </p:extLst>
   </p:cSld>
@@ -5506,8 +5506,8 @@
         </p:blipFill>
         <p:spPr>
           <a:xfrm>
-            <a:off x="324437" y="0"/>
-            <a:ext cx="8446366" cy="6858000"/>
+            <a:off x="95281" y="0"/>
+            <a:ext cx="8865831" cy="6858000"/>
           </a:xfrm>
           <a:prstGeom prst="rect">
             <a:avLst/>
@@ -5517,7 +5517,7 @@
     </p:spTree>
     <p:extLst>
       <p:ext uri="{BB962C8B-B14F-4D97-AF65-F5344CB8AC3E}">
-        <p14:creationId xmlns:p14="http://schemas.microsoft.com/office/powerpoint/2010/main" val="985832752"/>
+        <p14:creationId xmlns:p14="http://schemas.microsoft.com/office/powerpoint/2010/main" val="1618203320"/>
       </p:ext>
     </p:extLst>
   </p:cSld>
@@ -5752,7 +5752,7 @@
                   <a:srgbClr val="1D314E"/>
                 </a:solidFill>
               </a:rPr>
-              <a:t>“Read Hazard Sensor Data” </a:t>
+              <a:t>“Run Robot Searching”</a:t>
             </a:r>
             <a:r>
               <a:rPr lang="ko-KR" altLang="en-US" sz="4000" b="1" spc="-150" dirty="0" smtClean="0">
@@ -5760,7 +5760,7 @@
                   <a:srgbClr val="1D314E"/>
                 </a:solidFill>
               </a:rPr>
-              <a:t>순차도</a:t>
+              <a:t> 순차도</a:t>
             </a:r>
             <a:endParaRPr lang="ko-KR" altLang="en-US" sz="4000" b="1" spc="-150" dirty="0">
               <a:solidFill>
@@ -5772,7 +5772,7 @@
       </p:sp>
       <p:pic>
         <p:nvPicPr>
-          <p:cNvPr id="2" name="그림 1"/>
+          <p:cNvPr id="3" name="그림 2"/>
           <p:cNvPicPr>
             <a:picLocks noChangeAspect="1"/>
           </p:cNvPicPr>
@@ -5792,8 +5792,8 @@
         </p:blipFill>
         <p:spPr>
           <a:xfrm>
-            <a:off x="1055543" y="1813187"/>
-            <a:ext cx="7150467" cy="4578585"/>
+            <a:off x="324437" y="0"/>
+            <a:ext cx="8446366" cy="6858000"/>
           </a:xfrm>
           <a:prstGeom prst="rect">
             <a:avLst/>
@@ -5803,7 +5803,7 @@
     </p:spTree>
     <p:extLst>
       <p:ext uri="{BB962C8B-B14F-4D97-AF65-F5344CB8AC3E}">
-        <p14:creationId xmlns:p14="http://schemas.microsoft.com/office/powerpoint/2010/main" val="2280922995"/>
+        <p14:creationId xmlns:p14="http://schemas.microsoft.com/office/powerpoint/2010/main" val="985832752"/>
       </p:ext>
     </p:extLst>
   </p:cSld>
@@ -6038,39 +6038,7 @@
                   <a:srgbClr val="1D314E"/>
                 </a:solidFill>
               </a:rPr>
-              <a:t>“</a:t>
-            </a:r>
-            <a:r>
-              <a:rPr lang="en-US" altLang="ko-KR" sz="4000" b="1" spc="-150" dirty="0">
-                <a:solidFill>
-                  <a:srgbClr val="1D314E"/>
-                </a:solidFill>
-              </a:rPr>
-              <a:t>Read </a:t>
-            </a:r>
-            <a:r>
-              <a:rPr lang="en-US" altLang="ko-KR" sz="4000" b="1" spc="-150" dirty="0" smtClean="0">
-                <a:solidFill>
-                  <a:srgbClr val="1D314E"/>
-                </a:solidFill>
-              </a:rPr>
-              <a:t>Color Blob </a:t>
-            </a:r>
-            <a:r>
-              <a:rPr lang="en-US" altLang="ko-KR" sz="4000" b="1" spc="-150" dirty="0">
-                <a:solidFill>
-                  <a:srgbClr val="1D314E"/>
-                </a:solidFill>
-              </a:rPr>
-              <a:t>Sensor Data</a:t>
-            </a:r>
-            <a:r>
-              <a:rPr lang="en-US" altLang="ko-KR" sz="4000" b="1" spc="-150" dirty="0" smtClean="0">
-                <a:solidFill>
-                  <a:srgbClr val="1D314E"/>
-                </a:solidFill>
-              </a:rPr>
-              <a:t>” </a:t>
+              <a:t>“Read Hazard Sensor Data” </a:t>
             </a:r>
             <a:r>
               <a:rPr lang="ko-KR" altLang="en-US" sz="4000" b="1" spc="-150" dirty="0" smtClean="0">
@@ -6110,8 +6078,8 @@
         </p:blipFill>
         <p:spPr>
           <a:xfrm>
-            <a:off x="666766" y="1450994"/>
-            <a:ext cx="7802074" cy="5063676"/>
+            <a:off x="1055543" y="1813187"/>
+            <a:ext cx="7150467" cy="4578585"/>
           </a:xfrm>
           <a:prstGeom prst="rect">
             <a:avLst/>
@@ -6121,7 +6089,7 @@
     </p:spTree>
     <p:extLst>
       <p:ext uri="{BB962C8B-B14F-4D97-AF65-F5344CB8AC3E}">
-        <p14:creationId xmlns:p14="http://schemas.microsoft.com/office/powerpoint/2010/main" val="508819081"/>
+        <p14:creationId xmlns:p14="http://schemas.microsoft.com/office/powerpoint/2010/main" val="2280922995"/>
       </p:ext>
     </p:extLst>
   </p:cSld>
@@ -6372,7 +6340,23 @@
                   <a:srgbClr val="1D314E"/>
                 </a:solidFill>
               </a:rPr>
-              <a:t>Positioning Sensor Data” </a:t>
+              <a:t>Color Blob </a:t>
+            </a:r>
+            <a:r>
+              <a:rPr lang="en-US" altLang="ko-KR" sz="4000" b="1" spc="-150" dirty="0">
+                <a:solidFill>
+                  <a:srgbClr val="1D314E"/>
+                </a:solidFill>
+              </a:rPr>
+              <a:t>Sensor Data</a:t>
+            </a:r>
+            <a:r>
+              <a:rPr lang="en-US" altLang="ko-KR" sz="4000" b="1" spc="-150" dirty="0" smtClean="0">
+                <a:solidFill>
+                  <a:srgbClr val="1D314E"/>
+                </a:solidFill>
+              </a:rPr>
+              <a:t>” </a:t>
             </a:r>
             <a:r>
               <a:rPr lang="ko-KR" altLang="en-US" sz="4000" b="1" spc="-150" dirty="0" smtClean="0">
@@ -6412,8 +6396,8 @@
         </p:blipFill>
         <p:spPr>
           <a:xfrm>
-            <a:off x="967144" y="1549886"/>
-            <a:ext cx="7201317" cy="4955502"/>
+            <a:off x="666766" y="1450994"/>
+            <a:ext cx="7802074" cy="5063676"/>
           </a:xfrm>
           <a:prstGeom prst="rect">
             <a:avLst/>
@@ -6423,7 +6407,7 @@
     </p:spTree>
     <p:extLst>
       <p:ext uri="{BB962C8B-B14F-4D97-AF65-F5344CB8AC3E}">
-        <p14:creationId xmlns:p14="http://schemas.microsoft.com/office/powerpoint/2010/main" val="3443853060"/>
+        <p14:creationId xmlns:p14="http://schemas.microsoft.com/office/powerpoint/2010/main" val="508819081"/>
       </p:ext>
     </p:extLst>
   </p:cSld>
@@ -6459,6 +6443,308 @@
       </p:grpSpPr>
       <p:sp>
         <p:nvSpPr>
+          <p:cNvPr id="20" name="TextBox 19"/>
+          <p:cNvSpPr txBox="1"/>
+          <p:nvPr/>
+        </p:nvSpPr>
+        <p:spPr>
+          <a:xfrm>
+            <a:off x="263455" y="195231"/>
+            <a:ext cx="1584176" cy="215444"/>
+          </a:xfrm>
+          <a:prstGeom prst="rect">
+            <a:avLst/>
+          </a:prstGeom>
+          <a:noFill/>
+        </p:spPr>
+        <p:txBody>
+          <a:bodyPr wrap="square" rtlCol="0">
+            <a:spAutoFit/>
+          </a:bodyPr>
+          <a:lstStyle/>
+          <a:p>
+            <a:r>
+              <a:rPr lang="en-US" altLang="ko-KR" sz="800" spc="-30" dirty="0" smtClean="0">
+                <a:solidFill>
+                  <a:schemeClr val="tx1">
+                    <a:lumMod val="95000"/>
+                    <a:lumOff val="5000"/>
+                  </a:schemeClr>
+                </a:solidFill>
+                <a:latin typeface="나눔고딕" pitchFamily="50" charset="-127"/>
+                <a:ea typeface="나눔고딕" pitchFamily="50" charset="-127"/>
+              </a:rPr>
+              <a:t>2. </a:t>
+            </a:r>
+            <a:r>
+              <a:rPr lang="ko-KR" altLang="en-US" sz="800" spc="-30" dirty="0" err="1" smtClean="0">
+                <a:solidFill>
+                  <a:schemeClr val="tx1">
+                    <a:lumMod val="95000"/>
+                    <a:lumOff val="5000"/>
+                  </a:schemeClr>
+                </a:solidFill>
+                <a:latin typeface="나눔고딕" pitchFamily="50" charset="-127"/>
+                <a:ea typeface="나눔고딕" pitchFamily="50" charset="-127"/>
+              </a:rPr>
+              <a:t>유즈케이스도와</a:t>
+            </a:r>
+            <a:r>
+              <a:rPr lang="ko-KR" altLang="en-US" sz="800" spc="-30" dirty="0" smtClean="0">
+                <a:solidFill>
+                  <a:schemeClr val="tx1">
+                    <a:lumMod val="95000"/>
+                    <a:lumOff val="5000"/>
+                  </a:schemeClr>
+                </a:solidFill>
+                <a:latin typeface="나눔고딕" pitchFamily="50" charset="-127"/>
+                <a:ea typeface="나눔고딕" pitchFamily="50" charset="-127"/>
+              </a:rPr>
+              <a:t> 설명</a:t>
+            </a:r>
+            <a:endParaRPr lang="en-US" altLang="ko-KR" sz="800" spc="-30" dirty="0" smtClean="0">
+              <a:solidFill>
+                <a:schemeClr val="tx1">
+                  <a:lumMod val="95000"/>
+                  <a:lumOff val="5000"/>
+                </a:schemeClr>
+              </a:solidFill>
+              <a:latin typeface="나눔고딕" pitchFamily="50" charset="-127"/>
+              <a:ea typeface="나눔고딕" pitchFamily="50" charset="-127"/>
+            </a:endParaRPr>
+          </a:p>
+        </p:txBody>
+      </p:sp>
+      <p:cxnSp>
+        <p:nvCxnSpPr>
+          <p:cNvPr id="22" name="직선 연결선 21"/>
+          <p:cNvCxnSpPr/>
+          <p:nvPr/>
+        </p:nvCxnSpPr>
+        <p:spPr>
+          <a:xfrm>
+            <a:off x="364803" y="547859"/>
+            <a:ext cx="8406000" cy="0"/>
+          </a:xfrm>
+          <a:prstGeom prst="line">
+            <a:avLst/>
+          </a:prstGeom>
+          <a:ln w="3175">
+            <a:solidFill>
+              <a:schemeClr val="accent4">
+                <a:lumMod val="50000"/>
+              </a:schemeClr>
+            </a:solidFill>
+          </a:ln>
+        </p:spPr>
+        <p:style>
+          <a:lnRef idx="1">
+            <a:schemeClr val="accent1"/>
+          </a:lnRef>
+          <a:fillRef idx="0">
+            <a:schemeClr val="accent1"/>
+          </a:fillRef>
+          <a:effectRef idx="0">
+            <a:schemeClr val="accent1"/>
+          </a:effectRef>
+          <a:fontRef idx="minor">
+            <a:schemeClr val="tx1"/>
+          </a:fontRef>
+        </p:style>
+      </p:cxnSp>
+      <p:sp>
+        <p:nvSpPr>
+          <p:cNvPr id="28" name="TextBox 27"/>
+          <p:cNvSpPr txBox="1"/>
+          <p:nvPr/>
+        </p:nvSpPr>
+        <p:spPr>
+          <a:xfrm>
+            <a:off x="7277411" y="195231"/>
+            <a:ext cx="1584176" cy="215444"/>
+          </a:xfrm>
+          <a:prstGeom prst="rect">
+            <a:avLst/>
+          </a:prstGeom>
+          <a:noFill/>
+        </p:spPr>
+        <p:txBody>
+          <a:bodyPr wrap="square" rtlCol="0">
+            <a:spAutoFit/>
+          </a:bodyPr>
+          <a:lstStyle/>
+          <a:p>
+            <a:pPr algn="r"/>
+            <a:fld id="{DBA1376A-1BCE-4C3B-85BD-05D751D6B156}" type="slidenum">
+              <a:rPr lang="en-US" altLang="ko-KR" sz="800" spc="-30" smtClean="0">
+                <a:solidFill>
+                  <a:schemeClr val="tx1">
+                    <a:lumMod val="95000"/>
+                    <a:lumOff val="5000"/>
+                  </a:schemeClr>
+                </a:solidFill>
+                <a:latin typeface="나눔고딕" pitchFamily="50" charset="-127"/>
+                <a:ea typeface="나눔고딕" pitchFamily="50" charset="-127"/>
+              </a:rPr>
+              <a:pPr algn="r"/>
+              <a:t>18</a:t>
+            </a:fld>
+            <a:r>
+              <a:rPr lang="en-US" altLang="ko-KR" sz="800" spc="-30" dirty="0" smtClean="0">
+                <a:solidFill>
+                  <a:schemeClr val="tx1">
+                    <a:lumMod val="95000"/>
+                    <a:lumOff val="5000"/>
+                  </a:schemeClr>
+                </a:solidFill>
+                <a:latin typeface="나눔고딕" pitchFamily="50" charset="-127"/>
+                <a:ea typeface="나눔고딕" pitchFamily="50" charset="-127"/>
+              </a:rPr>
+              <a:t> / 14</a:t>
+            </a:r>
+            <a:endParaRPr lang="en-US" altLang="ko-KR" sz="800" spc="-30" dirty="0">
+              <a:solidFill>
+                <a:schemeClr val="tx1">
+                  <a:lumMod val="95000"/>
+                  <a:lumOff val="5000"/>
+                </a:schemeClr>
+              </a:solidFill>
+              <a:latin typeface="나눔고딕" pitchFamily="50" charset="-127"/>
+              <a:ea typeface="나눔고딕" pitchFamily="50" charset="-127"/>
+            </a:endParaRPr>
+          </a:p>
+        </p:txBody>
+      </p:sp>
+      <p:sp>
+        <p:nvSpPr>
+          <p:cNvPr id="23" name="제목 22"/>
+          <p:cNvSpPr>
+            <a:spLocks noGrp="1"/>
+          </p:cNvSpPr>
+          <p:nvPr>
+            <p:ph type="title"/>
+          </p:nvPr>
+        </p:nvSpPr>
+        <p:spPr>
+          <a:xfrm>
+            <a:off x="247649" y="552449"/>
+            <a:ext cx="8486775" cy="855663"/>
+          </a:xfrm>
+        </p:spPr>
+        <p:txBody>
+          <a:bodyPr/>
+          <a:lstStyle/>
+          <a:p>
+            <a:pPr algn="l"/>
+            <a:r>
+              <a:rPr lang="en-US" altLang="ko-KR" sz="4000" b="1" spc="-150" dirty="0" smtClean="0">
+                <a:solidFill>
+                  <a:srgbClr val="1D314E"/>
+                </a:solidFill>
+              </a:rPr>
+              <a:t>“</a:t>
+            </a:r>
+            <a:r>
+              <a:rPr lang="en-US" altLang="ko-KR" sz="4000" b="1" spc="-150" dirty="0">
+                <a:solidFill>
+                  <a:srgbClr val="1D314E"/>
+                </a:solidFill>
+              </a:rPr>
+              <a:t>Read </a:t>
+            </a:r>
+            <a:r>
+              <a:rPr lang="en-US" altLang="ko-KR" sz="4000" b="1" spc="-150" dirty="0" smtClean="0">
+                <a:solidFill>
+                  <a:srgbClr val="1D314E"/>
+                </a:solidFill>
+              </a:rPr>
+              <a:t>Positioning Sensor Data” </a:t>
+            </a:r>
+            <a:r>
+              <a:rPr lang="ko-KR" altLang="en-US" sz="4000" b="1" spc="-150" dirty="0" smtClean="0">
+                <a:solidFill>
+                  <a:srgbClr val="1D314E"/>
+                </a:solidFill>
+              </a:rPr>
+              <a:t>순차도</a:t>
+            </a:r>
+            <a:endParaRPr lang="ko-KR" altLang="en-US" sz="4000" b="1" spc="-150" dirty="0">
+              <a:solidFill>
+                <a:srgbClr val="1D314E"/>
+              </a:solidFill>
+            </a:endParaRPr>
+          </a:p>
+        </p:txBody>
+      </p:sp>
+      <p:pic>
+        <p:nvPicPr>
+          <p:cNvPr id="2" name="그림 1"/>
+          <p:cNvPicPr>
+            <a:picLocks noChangeAspect="1"/>
+          </p:cNvPicPr>
+          <p:nvPr/>
+        </p:nvPicPr>
+        <p:blipFill>
+          <a:blip r:embed="rId2">
+            <a:extLst>
+              <a:ext uri="{28A0092B-C50C-407E-A947-70E740481C1C}">
+                <a14:useLocalDpi xmlns:a14="http://schemas.microsoft.com/office/drawing/2010/main" val="0"/>
+              </a:ext>
+            </a:extLst>
+          </a:blip>
+          <a:stretch>
+            <a:fillRect/>
+          </a:stretch>
+        </p:blipFill>
+        <p:spPr>
+          <a:xfrm>
+            <a:off x="967144" y="1549886"/>
+            <a:ext cx="7201317" cy="4955502"/>
+          </a:xfrm>
+          <a:prstGeom prst="rect">
+            <a:avLst/>
+          </a:prstGeom>
+        </p:spPr>
+      </p:pic>
+    </p:spTree>
+    <p:extLst>
+      <p:ext uri="{BB962C8B-B14F-4D97-AF65-F5344CB8AC3E}">
+        <p14:creationId xmlns:p14="http://schemas.microsoft.com/office/powerpoint/2010/main" val="3443853060"/>
+      </p:ext>
+    </p:extLst>
+  </p:cSld>
+  <p:clrMapOvr>
+    <a:masterClrMapping/>
+  </p:clrMapOvr>
+  <p:timing>
+    <p:tnLst>
+      <p:par>
+        <p:cTn id="1" dur="indefinite" restart="never" nodeType="tmRoot"/>
+      </p:par>
+    </p:tnLst>
+  </p:timing>
+</p:sld>
+</file>
+
+<file path=ppt/slides/slide19.xml><?xml version="1.0" encoding="utf-8"?>
+<p:sld xmlns:a="http://schemas.openxmlformats.org/drawingml/2006/main" xmlns:r="http://schemas.openxmlformats.org/officeDocument/2006/relationships" xmlns:p="http://schemas.openxmlformats.org/presentationml/2006/main">
+  <p:cSld>
+    <p:spTree>
+      <p:nvGrpSpPr>
+        <p:cNvPr id="1" name=""/>
+        <p:cNvGrpSpPr/>
+        <p:nvPr/>
+      </p:nvGrpSpPr>
+      <p:grpSpPr>
+        <a:xfrm>
+          <a:off x="0" y="0"/>
+          <a:ext cx="0" cy="0"/>
+          <a:chOff x="0" y="0"/>
+          <a:chExt cx="0" cy="0"/>
+        </a:xfrm>
+      </p:grpSpPr>
+      <p:sp>
+        <p:nvSpPr>
           <p:cNvPr id="2" name="제목 1"/>
           <p:cNvSpPr>
             <a:spLocks noGrp="1"/>
@@ -6753,6 +7039,171 @@
       </p:grpSpPr>
       <p:sp>
         <p:nvSpPr>
+          <p:cNvPr id="2" name="제목 1"/>
+          <p:cNvSpPr>
+            <a:spLocks noGrp="1"/>
+          </p:cNvSpPr>
+          <p:nvPr>
+            <p:ph type="ctrTitle"/>
+          </p:nvPr>
+        </p:nvSpPr>
+        <p:spPr/>
+        <p:txBody>
+          <a:bodyPr/>
+          <a:lstStyle/>
+          <a:p>
+            <a:r>
+              <a:rPr lang="ko-KR" altLang="en-US" dirty="0" err="1" smtClean="0"/>
+              <a:t>유즈케이스도</a:t>
+            </a:r>
+            <a:r>
+              <a:rPr lang="en-US" altLang="ko-KR" dirty="0" smtClean="0"/>
+              <a:t>, </a:t>
+            </a:r>
+            <a:r>
+              <a:rPr lang="ko-KR" altLang="en-US" dirty="0" smtClean="0"/>
+              <a:t>클래스도</a:t>
+            </a:r>
+            <a:r>
+              <a:rPr lang="en-US" altLang="ko-KR" dirty="0" smtClean="0"/>
+              <a:t/>
+            </a:r>
+            <a:br>
+              <a:rPr lang="en-US" altLang="ko-KR" dirty="0" smtClean="0"/>
+            </a:br>
+            <a:endParaRPr lang="ko-KR" altLang="en-US" dirty="0"/>
+          </a:p>
+        </p:txBody>
+      </p:sp>
+      <p:sp>
+        <p:nvSpPr>
+          <p:cNvPr id="3" name="부제목 2"/>
+          <p:cNvSpPr>
+            <a:spLocks noGrp="1"/>
+          </p:cNvSpPr>
+          <p:nvPr>
+            <p:ph type="subTitle" idx="1"/>
+          </p:nvPr>
+        </p:nvSpPr>
+        <p:spPr/>
+        <p:txBody>
+          <a:bodyPr>
+            <a:normAutofit fontScale="70000" lnSpcReduction="20000"/>
+          </a:bodyPr>
+          <a:lstStyle/>
+          <a:p>
+            <a:r>
+              <a:rPr lang="ko-KR" altLang="en-US" dirty="0" smtClean="0"/>
+              <a:t>진짜 </a:t>
+            </a:r>
+            <a:r>
+              <a:rPr lang="ko-KR" altLang="en-US" dirty="0" err="1" smtClean="0"/>
+              <a:t>코드랑</a:t>
+            </a:r>
+            <a:r>
+              <a:rPr lang="ko-KR" altLang="en-US" dirty="0" smtClean="0"/>
+              <a:t> 똑같이 했나</a:t>
+            </a:r>
+            <a:endParaRPr lang="en-US" altLang="ko-KR" dirty="0" smtClean="0"/>
+          </a:p>
+          <a:p>
+            <a:r>
+              <a:rPr lang="ko-KR" altLang="en-US" dirty="0" err="1" smtClean="0"/>
+              <a:t>보기위해서</a:t>
+            </a:r>
+            <a:r>
+              <a:rPr lang="ko-KR" altLang="en-US" dirty="0" smtClean="0"/>
+              <a:t> 같이 </a:t>
+            </a:r>
+            <a:r>
+              <a:rPr lang="ko-KR" altLang="en-US" dirty="0" err="1" smtClean="0"/>
+              <a:t>뛰어야한다</a:t>
+            </a:r>
+            <a:endParaRPr lang="en-US" altLang="ko-KR" dirty="0" smtClean="0"/>
+          </a:p>
+          <a:p>
+            <a:r>
+              <a:rPr lang="ko-KR" altLang="en-US" dirty="0" err="1" smtClean="0"/>
+              <a:t>클래스도랑</a:t>
+            </a:r>
+            <a:r>
+              <a:rPr lang="ko-KR" altLang="en-US" dirty="0" smtClean="0"/>
+              <a:t> </a:t>
+            </a:r>
+            <a:r>
+              <a:rPr lang="ko-KR" altLang="en-US" dirty="0" err="1" smtClean="0"/>
+              <a:t>시퀀스도랑</a:t>
+            </a:r>
+            <a:r>
+              <a:rPr lang="ko-KR" altLang="en-US" dirty="0" smtClean="0"/>
+              <a:t> </a:t>
+            </a:r>
+            <a:r>
+              <a:rPr lang="ko-KR" altLang="en-US" dirty="0" err="1" smtClean="0"/>
+              <a:t>코드랑</a:t>
+            </a:r>
+            <a:r>
+              <a:rPr lang="ko-KR" altLang="en-US" dirty="0" smtClean="0"/>
+              <a:t> 같이 띄운다</a:t>
+            </a:r>
+            <a:endParaRPr lang="en-US" altLang="ko-KR" dirty="0" smtClean="0"/>
+          </a:p>
+          <a:p>
+            <a:endParaRPr lang="en-US" altLang="ko-KR" dirty="0"/>
+          </a:p>
+          <a:p>
+            <a:r>
+              <a:rPr lang="ko-KR" altLang="en-US" dirty="0" err="1" smtClean="0"/>
+              <a:t>시퀀스도랑</a:t>
+            </a:r>
+            <a:r>
+              <a:rPr lang="ko-KR" altLang="en-US" dirty="0" smtClean="0"/>
+              <a:t> </a:t>
+            </a:r>
+            <a:r>
+              <a:rPr lang="ko-KR" altLang="en-US" dirty="0" err="1" smtClean="0"/>
+              <a:t>코드랑</a:t>
+            </a:r>
+            <a:r>
+              <a:rPr lang="ko-KR" altLang="en-US" dirty="0" smtClean="0"/>
+              <a:t> 해놓고</a:t>
+            </a:r>
+            <a:endParaRPr lang="ko-KR" altLang="en-US" dirty="0"/>
+          </a:p>
+        </p:txBody>
+      </p:sp>
+    </p:spTree>
+    <p:extLst>
+      <p:ext uri="{BB962C8B-B14F-4D97-AF65-F5344CB8AC3E}">
+        <p14:creationId xmlns:p14="http://schemas.microsoft.com/office/powerpoint/2010/main" val="365840672"/>
+      </p:ext>
+    </p:extLst>
+  </p:cSld>
+  <p:clrMapOvr>
+    <a:masterClrMapping/>
+  </p:clrMapOvr>
+</p:sld>
+</file>
+
+<file path=ppt/slides/slide3.xml><?xml version="1.0" encoding="utf-8"?>
+<p:sld xmlns:a="http://schemas.openxmlformats.org/drawingml/2006/main" xmlns:r="http://schemas.openxmlformats.org/officeDocument/2006/relationships" xmlns:p="http://schemas.openxmlformats.org/presentationml/2006/main">
+  <p:cSld>
+    <p:spTree>
+      <p:nvGrpSpPr>
+        <p:cNvPr id="1" name=""/>
+        <p:cNvGrpSpPr/>
+        <p:nvPr/>
+      </p:nvGrpSpPr>
+      <p:grpSpPr>
+        <a:xfrm>
+          <a:off x="0" y="0"/>
+          <a:ext cx="0" cy="0"/>
+          <a:chOff x="0" y="0"/>
+          <a:chExt cx="0" cy="0"/>
+        </a:xfrm>
+      </p:grpSpPr>
+      <p:sp>
+        <p:nvSpPr>
           <p:cNvPr id="25" name="부제목 2"/>
           <p:cNvSpPr txBox="1">
             <a:spLocks/>
@@ -7291,607 +7742,6 @@
         </p:spPr>
       </p:pic>
     </p:spTree>
-  </p:cSld>
-  <p:clrMapOvr>
-    <a:masterClrMapping/>
-  </p:clrMapOvr>
-  <p:timing>
-    <p:tnLst>
-      <p:par>
-        <p:cTn id="1" dur="indefinite" restart="never" nodeType="tmRoot"/>
-      </p:par>
-    </p:tnLst>
-  </p:timing>
-</p:sld>
-</file>
-
-<file path=ppt/slides/slide3.xml><?xml version="1.0" encoding="utf-8"?>
-<p:sld xmlns:a="http://schemas.openxmlformats.org/drawingml/2006/main" xmlns:r="http://schemas.openxmlformats.org/officeDocument/2006/relationships" xmlns:p="http://schemas.openxmlformats.org/presentationml/2006/main">
-  <p:cSld>
-    <p:spTree>
-      <p:nvGrpSpPr>
-        <p:cNvPr id="1" name=""/>
-        <p:cNvGrpSpPr/>
-        <p:nvPr/>
-      </p:nvGrpSpPr>
-      <p:grpSpPr>
-        <a:xfrm>
-          <a:off x="0" y="0"/>
-          <a:ext cx="0" cy="0"/>
-          <a:chOff x="0" y="0"/>
-          <a:chExt cx="0" cy="0"/>
-        </a:xfrm>
-      </p:grpSpPr>
-      <p:sp>
-        <p:nvSpPr>
-          <p:cNvPr id="5" name="TextBox 4"/>
-          <p:cNvSpPr txBox="1"/>
-          <p:nvPr/>
-        </p:nvSpPr>
-        <p:spPr>
-          <a:xfrm>
-            <a:off x="263455" y="195231"/>
-            <a:ext cx="1584176" cy="215444"/>
-          </a:xfrm>
-          <a:prstGeom prst="rect">
-            <a:avLst/>
-          </a:prstGeom>
-          <a:noFill/>
-        </p:spPr>
-        <p:txBody>
-          <a:bodyPr wrap="square" rtlCol="0">
-            <a:spAutoFit/>
-          </a:bodyPr>
-          <a:lstStyle/>
-          <a:p>
-            <a:r>
-              <a:rPr lang="en-US" altLang="ko-KR" sz="800" spc="-30" dirty="0" smtClean="0">
-                <a:solidFill>
-                  <a:schemeClr val="tx1">
-                    <a:lumMod val="95000"/>
-                    <a:lumOff val="5000"/>
-                  </a:schemeClr>
-                </a:solidFill>
-                <a:latin typeface="나눔고딕" pitchFamily="50" charset="-127"/>
-                <a:ea typeface="나눔고딕" pitchFamily="50" charset="-127"/>
-              </a:rPr>
-              <a:t>1.1 </a:t>
-            </a:r>
-            <a:r>
-              <a:rPr lang="ko-KR" altLang="en-US" sz="800" spc="-30" dirty="0" smtClean="0">
-                <a:solidFill>
-                  <a:schemeClr val="tx1">
-                    <a:lumMod val="95000"/>
-                    <a:lumOff val="5000"/>
-                  </a:schemeClr>
-                </a:solidFill>
-                <a:latin typeface="나눔고딕" pitchFamily="50" charset="-127"/>
-                <a:ea typeface="나눔고딕" pitchFamily="50" charset="-127"/>
-              </a:rPr>
-              <a:t>프로젝트 소개</a:t>
-            </a:r>
-            <a:endParaRPr lang="en-US" altLang="ko-KR" sz="800" spc="-30" dirty="0">
-              <a:solidFill>
-                <a:schemeClr val="tx1">
-                  <a:lumMod val="95000"/>
-                  <a:lumOff val="5000"/>
-                </a:schemeClr>
-              </a:solidFill>
-              <a:latin typeface="나눔고딕" pitchFamily="50" charset="-127"/>
-              <a:ea typeface="나눔고딕" pitchFamily="50" charset="-127"/>
-            </a:endParaRPr>
-          </a:p>
-        </p:txBody>
-      </p:sp>
-      <p:cxnSp>
-        <p:nvCxnSpPr>
-          <p:cNvPr id="20" name="직선 연결선 19"/>
-          <p:cNvCxnSpPr/>
-          <p:nvPr/>
-        </p:nvCxnSpPr>
-        <p:spPr>
-          <a:xfrm>
-            <a:off x="364803" y="547859"/>
-            <a:ext cx="8406000" cy="0"/>
-          </a:xfrm>
-          <a:prstGeom prst="line">
-            <a:avLst/>
-          </a:prstGeom>
-          <a:ln w="3175">
-            <a:solidFill>
-              <a:schemeClr val="accent4">
-                <a:lumMod val="50000"/>
-              </a:schemeClr>
-            </a:solidFill>
-          </a:ln>
-        </p:spPr>
-        <p:style>
-          <a:lnRef idx="1">
-            <a:schemeClr val="accent1"/>
-          </a:lnRef>
-          <a:fillRef idx="0">
-            <a:schemeClr val="accent1"/>
-          </a:fillRef>
-          <a:effectRef idx="0">
-            <a:schemeClr val="accent1"/>
-          </a:effectRef>
-          <a:fontRef idx="minor">
-            <a:schemeClr val="tx1"/>
-          </a:fontRef>
-        </p:style>
-      </p:cxnSp>
-      <p:sp>
-        <p:nvSpPr>
-          <p:cNvPr id="31" name="제목 1"/>
-          <p:cNvSpPr>
-            <a:spLocks noGrp="1"/>
-          </p:cNvSpPr>
-          <p:nvPr>
-            <p:ph type="title"/>
-          </p:nvPr>
-        </p:nvSpPr>
-        <p:spPr>
-          <a:xfrm>
-            <a:off x="256544" y="700126"/>
-            <a:ext cx="6995120" cy="580926"/>
-          </a:xfrm>
-        </p:spPr>
-        <p:txBody>
-          <a:bodyPr>
-            <a:noAutofit/>
-          </a:bodyPr>
-          <a:lstStyle/>
-          <a:p>
-            <a:pPr algn="l"/>
-            <a:r>
-              <a:rPr lang="ko-KR" altLang="en-US" sz="4000" b="1" spc="-150" dirty="0" smtClean="0">
-                <a:solidFill>
-                  <a:schemeClr val="accent4">
-                    <a:lumMod val="50000"/>
-                  </a:schemeClr>
-                </a:solidFill>
-              </a:rPr>
-              <a:t>프로젝트 소개</a:t>
-            </a:r>
-            <a:endParaRPr lang="ko-KR" altLang="en-US" sz="4000" b="1" spc="-150" dirty="0">
-              <a:solidFill>
-                <a:schemeClr val="accent4">
-                  <a:lumMod val="50000"/>
-                </a:schemeClr>
-              </a:solidFill>
-              <a:latin typeface="나눔고딕" pitchFamily="50" charset="-127"/>
-              <a:ea typeface="나눔고딕" pitchFamily="50" charset="-127"/>
-            </a:endParaRPr>
-          </a:p>
-        </p:txBody>
-      </p:sp>
-      <p:sp>
-        <p:nvSpPr>
-          <p:cNvPr id="9" name="TextBox 8"/>
-          <p:cNvSpPr txBox="1"/>
-          <p:nvPr/>
-        </p:nvSpPr>
-        <p:spPr>
-          <a:xfrm>
-            <a:off x="7277411" y="195231"/>
-            <a:ext cx="1584176" cy="215444"/>
-          </a:xfrm>
-          <a:prstGeom prst="rect">
-            <a:avLst/>
-          </a:prstGeom>
-          <a:noFill/>
-        </p:spPr>
-        <p:txBody>
-          <a:bodyPr wrap="square" rtlCol="0">
-            <a:spAutoFit/>
-          </a:bodyPr>
-          <a:lstStyle/>
-          <a:p>
-            <a:pPr algn="r"/>
-            <a:fld id="{DBA1376A-1BCE-4C3B-85BD-05D751D6B156}" type="slidenum">
-              <a:rPr lang="en-US" altLang="ko-KR" sz="800" spc="-30" smtClean="0">
-                <a:solidFill>
-                  <a:schemeClr val="tx1">
-                    <a:lumMod val="95000"/>
-                    <a:lumOff val="5000"/>
-                  </a:schemeClr>
-                </a:solidFill>
-                <a:latin typeface="나눔고딕" pitchFamily="50" charset="-127"/>
-                <a:ea typeface="나눔고딕" pitchFamily="50" charset="-127"/>
-              </a:rPr>
-              <a:pPr algn="r"/>
-              <a:t>3</a:t>
-            </a:fld>
-            <a:r>
-              <a:rPr lang="en-US" altLang="ko-KR" sz="800" spc="-30" dirty="0" smtClean="0">
-                <a:solidFill>
-                  <a:schemeClr val="tx1">
-                    <a:lumMod val="95000"/>
-                    <a:lumOff val="5000"/>
-                  </a:schemeClr>
-                </a:solidFill>
-                <a:latin typeface="나눔고딕" pitchFamily="50" charset="-127"/>
-                <a:ea typeface="나눔고딕" pitchFamily="50" charset="-127"/>
-              </a:rPr>
-              <a:t> / 14</a:t>
-            </a:r>
-            <a:endParaRPr lang="en-US" altLang="ko-KR" sz="800" spc="-30" dirty="0">
-              <a:solidFill>
-                <a:schemeClr val="tx1">
-                  <a:lumMod val="95000"/>
-                  <a:lumOff val="5000"/>
-                </a:schemeClr>
-              </a:solidFill>
-              <a:latin typeface="나눔고딕" pitchFamily="50" charset="-127"/>
-              <a:ea typeface="나눔고딕" pitchFamily="50" charset="-127"/>
-            </a:endParaRPr>
-          </a:p>
-        </p:txBody>
-      </p:sp>
-      <p:sp>
-        <p:nvSpPr>
-          <p:cNvPr id="8" name="내용 개체 틀 2"/>
-          <p:cNvSpPr txBox="1">
-            <a:spLocks/>
-          </p:cNvSpPr>
-          <p:nvPr/>
-        </p:nvSpPr>
-        <p:spPr>
-          <a:xfrm>
-            <a:off x="259795" y="1631109"/>
-            <a:ext cx="8470547" cy="1275443"/>
-          </a:xfrm>
-          <a:prstGeom prst="rect">
-            <a:avLst/>
-          </a:prstGeom>
-        </p:spPr>
-        <p:txBody>
-          <a:bodyPr vert="horz" lIns="91440" tIns="45720" rIns="91440" bIns="45720" rtlCol="0">
-            <a:normAutofit/>
-          </a:bodyPr>
-          <a:lstStyle>
-            <a:lvl1pPr marL="342900" indent="-342900" algn="l" defTabSz="914400" rtl="0" eaLnBrk="1" latinLnBrk="1" hangingPunct="1">
-              <a:spcBef>
-                <a:spcPct val="20000"/>
-              </a:spcBef>
-              <a:buFont typeface="Arial" pitchFamily="34" charset="0"/>
-              <a:buChar char="•"/>
-              <a:defRPr sz="3200" kern="1200">
-                <a:solidFill>
-                  <a:schemeClr val="tx1"/>
-                </a:solidFill>
-                <a:latin typeface="+mn-lt"/>
-                <a:ea typeface="+mn-ea"/>
-                <a:cs typeface="+mn-cs"/>
-              </a:defRPr>
-            </a:lvl1pPr>
-            <a:lvl2pPr marL="742950" indent="-285750" algn="l" defTabSz="914400" rtl="0" eaLnBrk="1" latinLnBrk="1" hangingPunct="1">
-              <a:spcBef>
-                <a:spcPct val="20000"/>
-              </a:spcBef>
-              <a:buFont typeface="Arial" pitchFamily="34" charset="0"/>
-              <a:buChar char="–"/>
-              <a:defRPr sz="2800" kern="1200">
-                <a:solidFill>
-                  <a:schemeClr val="tx1"/>
-                </a:solidFill>
-                <a:latin typeface="+mn-lt"/>
-                <a:ea typeface="+mn-ea"/>
-                <a:cs typeface="+mn-cs"/>
-              </a:defRPr>
-            </a:lvl2pPr>
-            <a:lvl3pPr marL="1143000" indent="-228600" algn="l" defTabSz="914400" rtl="0" eaLnBrk="1" latinLnBrk="1" hangingPunct="1">
-              <a:spcBef>
-                <a:spcPct val="20000"/>
-              </a:spcBef>
-              <a:buFont typeface="Arial" pitchFamily="34" charset="0"/>
-              <a:buChar char="•"/>
-              <a:defRPr sz="2400" kern="1200">
-                <a:solidFill>
-                  <a:schemeClr val="tx1"/>
-                </a:solidFill>
-                <a:latin typeface="+mn-lt"/>
-                <a:ea typeface="+mn-ea"/>
-                <a:cs typeface="+mn-cs"/>
-              </a:defRPr>
-            </a:lvl3pPr>
-            <a:lvl4pPr marL="1600200" indent="-228600" algn="l" defTabSz="914400" rtl="0" eaLnBrk="1" latinLnBrk="1" hangingPunct="1">
-              <a:spcBef>
-                <a:spcPct val="20000"/>
-              </a:spcBef>
-              <a:buFont typeface="Arial" pitchFamily="34" charset="0"/>
-              <a:buChar char="–"/>
-              <a:defRPr sz="2000" kern="1200">
-                <a:solidFill>
-                  <a:schemeClr val="tx1"/>
-                </a:solidFill>
-                <a:latin typeface="+mn-lt"/>
-                <a:ea typeface="+mn-ea"/>
-                <a:cs typeface="+mn-cs"/>
-              </a:defRPr>
-            </a:lvl4pPr>
-            <a:lvl5pPr marL="2057400" indent="-228600" algn="l" defTabSz="914400" rtl="0" eaLnBrk="1" latinLnBrk="1" hangingPunct="1">
-              <a:spcBef>
-                <a:spcPct val="20000"/>
-              </a:spcBef>
-              <a:buFont typeface="Arial" pitchFamily="34" charset="0"/>
-              <a:buChar char="»"/>
-              <a:defRPr sz="2000" kern="1200">
-                <a:solidFill>
-                  <a:schemeClr val="tx1"/>
-                </a:solidFill>
-                <a:latin typeface="+mn-lt"/>
-                <a:ea typeface="+mn-ea"/>
-                <a:cs typeface="+mn-cs"/>
-              </a:defRPr>
-            </a:lvl5pPr>
-            <a:lvl6pPr marL="2514600" indent="-228600" algn="l" defTabSz="914400" rtl="0" eaLnBrk="1" latinLnBrk="1" hangingPunct="1">
-              <a:spcBef>
-                <a:spcPct val="20000"/>
-              </a:spcBef>
-              <a:buFont typeface="Arial" pitchFamily="34" charset="0"/>
-              <a:buChar char="•"/>
-              <a:defRPr sz="2000" kern="1200">
-                <a:solidFill>
-                  <a:schemeClr val="tx1"/>
-                </a:solidFill>
-                <a:latin typeface="+mn-lt"/>
-                <a:ea typeface="+mn-ea"/>
-                <a:cs typeface="+mn-cs"/>
-              </a:defRPr>
-            </a:lvl6pPr>
-            <a:lvl7pPr marL="2971800" indent="-228600" algn="l" defTabSz="914400" rtl="0" eaLnBrk="1" latinLnBrk="1" hangingPunct="1">
-              <a:spcBef>
-                <a:spcPct val="20000"/>
-              </a:spcBef>
-              <a:buFont typeface="Arial" pitchFamily="34" charset="0"/>
-              <a:buChar char="•"/>
-              <a:defRPr sz="2000" kern="1200">
-                <a:solidFill>
-                  <a:schemeClr val="tx1"/>
-                </a:solidFill>
-                <a:latin typeface="+mn-lt"/>
-                <a:ea typeface="+mn-ea"/>
-                <a:cs typeface="+mn-cs"/>
-              </a:defRPr>
-            </a:lvl7pPr>
-            <a:lvl8pPr marL="3429000" indent="-228600" algn="l" defTabSz="914400" rtl="0" eaLnBrk="1" latinLnBrk="1" hangingPunct="1">
-              <a:spcBef>
-                <a:spcPct val="20000"/>
-              </a:spcBef>
-              <a:buFont typeface="Arial" pitchFamily="34" charset="0"/>
-              <a:buChar char="•"/>
-              <a:defRPr sz="2000" kern="1200">
-                <a:solidFill>
-                  <a:schemeClr val="tx1"/>
-                </a:solidFill>
-                <a:latin typeface="+mn-lt"/>
-                <a:ea typeface="+mn-ea"/>
-                <a:cs typeface="+mn-cs"/>
-              </a:defRPr>
-            </a:lvl8pPr>
-            <a:lvl9pPr marL="3886200" indent="-228600" algn="l" defTabSz="914400" rtl="0" eaLnBrk="1" latinLnBrk="1" hangingPunct="1">
-              <a:spcBef>
-                <a:spcPct val="20000"/>
-              </a:spcBef>
-              <a:buFont typeface="Arial" pitchFamily="34" charset="0"/>
-              <a:buChar char="•"/>
-              <a:defRPr sz="2000" kern="1200">
-                <a:solidFill>
-                  <a:schemeClr val="tx1"/>
-                </a:solidFill>
-                <a:latin typeface="+mn-lt"/>
-                <a:ea typeface="+mn-ea"/>
-                <a:cs typeface="+mn-cs"/>
-              </a:defRPr>
-            </a:lvl9pPr>
-          </a:lstStyle>
-          <a:p>
-            <a:pPr marL="0" indent="0">
-              <a:buFont typeface="Arial" pitchFamily="34" charset="0"/>
-              <a:buNone/>
-            </a:pPr>
-            <a:r>
-              <a:rPr lang="en-US" altLang="ko-KR" sz="1200" b="1" dirty="0">
-                <a:solidFill>
-                  <a:srgbClr val="3D3C3E"/>
-                </a:solidFill>
-                <a:latin typeface="나눔고딕" pitchFamily="50" charset="-127"/>
-                <a:ea typeface="나눔고딕" pitchFamily="50" charset="-127"/>
-              </a:rPr>
-              <a:t> </a:t>
-            </a:r>
-            <a:r>
-              <a:rPr lang="en-US" altLang="ko-KR" sz="1200" b="1" dirty="0" smtClean="0">
-                <a:solidFill>
-                  <a:srgbClr val="3D3C3E"/>
-                </a:solidFill>
-                <a:latin typeface="나눔고딕" pitchFamily="50" charset="-127"/>
-                <a:ea typeface="나눔고딕" pitchFamily="50" charset="-127"/>
-              </a:rPr>
-              <a:t> Sim</a:t>
-            </a:r>
-            <a:r>
-              <a:rPr lang="ko-KR" altLang="en-US" sz="1200" b="1" dirty="0" smtClean="0">
-                <a:solidFill>
-                  <a:srgbClr val="3D3C3E"/>
-                </a:solidFill>
-                <a:latin typeface="나눔고딕" pitchFamily="50" charset="-127"/>
-                <a:ea typeface="나눔고딕" pitchFamily="50" charset="-127"/>
-              </a:rPr>
-              <a:t>을 재사용하되 재난 지역에 대한 정보가 부족한 상태에서</a:t>
-            </a:r>
-            <a:endParaRPr lang="en-US" altLang="ko-KR" sz="1200" b="1" dirty="0" smtClean="0">
-              <a:solidFill>
-                <a:srgbClr val="3D3C3E"/>
-              </a:solidFill>
-              <a:latin typeface="나눔고딕" pitchFamily="50" charset="-127"/>
-              <a:ea typeface="나눔고딕" pitchFamily="50" charset="-127"/>
-            </a:endParaRPr>
-          </a:p>
-          <a:p>
-            <a:pPr marL="0" indent="0">
-              <a:buFont typeface="Arial" pitchFamily="34" charset="0"/>
-              <a:buNone/>
-            </a:pPr>
-            <a:r>
-              <a:rPr lang="ko-KR" altLang="en-US" sz="1200" b="1" dirty="0" smtClean="0">
-                <a:solidFill>
-                  <a:srgbClr val="3D3C3E"/>
-                </a:solidFill>
-                <a:latin typeface="나눔고딕" pitchFamily="50" charset="-127"/>
-                <a:ea typeface="나눔고딕" pitchFamily="50" charset="-127"/>
-              </a:rPr>
-              <a:t>로봇의 동작을 자동으로 제어할 수 있도록 하는 시스템인 </a:t>
-            </a:r>
-            <a:endParaRPr lang="en-US" altLang="ko-KR" sz="1200" b="1" dirty="0" smtClean="0">
-              <a:solidFill>
-                <a:srgbClr val="3D3C3E"/>
-              </a:solidFill>
-              <a:latin typeface="나눔고딕" pitchFamily="50" charset="-127"/>
-              <a:ea typeface="나눔고딕" pitchFamily="50" charset="-127"/>
-            </a:endParaRPr>
-          </a:p>
-          <a:p>
-            <a:pPr marL="0" indent="0">
-              <a:buFont typeface="Arial" pitchFamily="34" charset="0"/>
-              <a:buNone/>
-            </a:pPr>
-            <a:r>
-              <a:rPr lang="en-US" altLang="ko-KR" sz="1200" b="1" dirty="0" smtClean="0">
-                <a:solidFill>
-                  <a:srgbClr val="3D3C3E"/>
-                </a:solidFill>
-                <a:latin typeface="나눔고딕" pitchFamily="50" charset="-127"/>
-                <a:ea typeface="나눔고딕" pitchFamily="50" charset="-127"/>
-              </a:rPr>
-              <a:t>ADD-ON(Additional </a:t>
-            </a:r>
-            <a:r>
-              <a:rPr lang="en-US" altLang="ko-KR" sz="1200" b="1" dirty="0" err="1" smtClean="0">
-                <a:solidFill>
-                  <a:srgbClr val="3D3C3E"/>
-                </a:solidFill>
-                <a:latin typeface="나눔고딕" pitchFamily="50" charset="-127"/>
-                <a:ea typeface="나눔고딕" pitchFamily="50" charset="-127"/>
-              </a:rPr>
-              <a:t>Moblie</a:t>
-            </a:r>
-            <a:r>
-              <a:rPr lang="en-US" altLang="ko-KR" sz="1200" b="1" dirty="0" smtClean="0">
-                <a:solidFill>
-                  <a:srgbClr val="3D3C3E"/>
-                </a:solidFill>
-                <a:latin typeface="나눔고딕" pitchFamily="50" charset="-127"/>
-                <a:ea typeface="나눔고딕" pitchFamily="50" charset="-127"/>
-              </a:rPr>
-              <a:t> Robot Controller) </a:t>
-            </a:r>
-            <a:r>
-              <a:rPr lang="ko-KR" altLang="en-US" sz="1200" b="1" dirty="0" smtClean="0">
-                <a:solidFill>
-                  <a:srgbClr val="3D3C3E"/>
-                </a:solidFill>
-                <a:latin typeface="나눔고딕" pitchFamily="50" charset="-127"/>
-                <a:ea typeface="나눔고딕" pitchFamily="50" charset="-127"/>
-              </a:rPr>
-              <a:t>시스템</a:t>
-            </a:r>
-            <a:r>
-              <a:rPr lang="en-US" altLang="ko-KR" sz="1200" b="1" dirty="0" smtClean="0">
-                <a:solidFill>
-                  <a:srgbClr val="3D3C3E"/>
-                </a:solidFill>
-                <a:latin typeface="나눔고딕" pitchFamily="50" charset="-127"/>
-                <a:ea typeface="나눔고딕" pitchFamily="50" charset="-127"/>
-              </a:rPr>
-              <a:t>.</a:t>
-            </a:r>
-            <a:endParaRPr lang="ko-KR" altLang="en-US" sz="1200" dirty="0" smtClean="0">
-              <a:solidFill>
-                <a:srgbClr val="3D3C3E"/>
-              </a:solidFill>
-              <a:latin typeface="나눔고딕" pitchFamily="50" charset="-127"/>
-              <a:ea typeface="나눔고딕" pitchFamily="50" charset="-127"/>
-            </a:endParaRPr>
-          </a:p>
-        </p:txBody>
-      </p:sp>
-      <p:sp>
-        <p:nvSpPr>
-          <p:cNvPr id="2" name="AutoShape 2" descr="robot에 대한 이미지 검색결과"/>
-          <p:cNvSpPr>
-            <a:spLocks noChangeAspect="1" noChangeArrowheads="1"/>
-          </p:cNvSpPr>
-          <p:nvPr/>
-        </p:nvSpPr>
-        <p:spPr bwMode="auto">
-          <a:xfrm>
-            <a:off x="155575" y="-144463"/>
-            <a:ext cx="304800" cy="304801"/>
-          </a:xfrm>
-          <a:prstGeom prst="rect">
-            <a:avLst/>
-          </a:prstGeom>
-          <a:noFill/>
-          <a:extLst>
-            <a:ext uri="{909E8E84-426E-40DD-AFC4-6F175D3DCCD1}">
-              <a14:hiddenFill xmlns:a14="http://schemas.microsoft.com/office/drawing/2010/main">
-                <a:solidFill>
-                  <a:srgbClr val="FFFFFF"/>
-                </a:solidFill>
-              </a14:hiddenFill>
-            </a:ext>
-          </a:extLst>
-        </p:spPr>
-        <p:txBody>
-          <a:bodyPr vert="horz" wrap="square" lIns="91440" tIns="45720" rIns="91440" bIns="45720" numCol="1" anchor="t" anchorCtr="0" compatLnSpc="1">
-            <a:prstTxWarp prst="textNoShape">
-              <a:avLst/>
-            </a:prstTxWarp>
-          </a:bodyPr>
-          <a:lstStyle/>
-          <a:p>
-            <a:endParaRPr lang="ko-KR" altLang="en-US"/>
-          </a:p>
-        </p:txBody>
-      </p:sp>
-      <p:pic>
-        <p:nvPicPr>
-          <p:cNvPr id="3" name="그림 2"/>
-          <p:cNvPicPr>
-            <a:picLocks noChangeAspect="1"/>
-          </p:cNvPicPr>
-          <p:nvPr/>
-        </p:nvPicPr>
-        <p:blipFill>
-          <a:blip r:embed="rId3">
-            <a:extLst>
-              <a:ext uri="{28A0092B-C50C-407E-A947-70E740481C1C}">
-                <a14:useLocalDpi xmlns:a14="http://schemas.microsoft.com/office/drawing/2010/main" val="0"/>
-              </a:ext>
-            </a:extLst>
-          </a:blip>
-          <a:stretch>
-            <a:fillRect/>
-          </a:stretch>
-        </p:blipFill>
-        <p:spPr>
-          <a:xfrm>
-            <a:off x="2722057" y="2661556"/>
-            <a:ext cx="3546021" cy="3546021"/>
-          </a:xfrm>
-          <a:prstGeom prst="rect">
-            <a:avLst/>
-          </a:prstGeom>
-        </p:spPr>
-      </p:pic>
-    </p:spTree>
-    <p:extLst>
-      <p:ext uri="{BB962C8B-B14F-4D97-AF65-F5344CB8AC3E}">
-        <p14:creationId xmlns:p14="http://schemas.microsoft.com/office/powerpoint/2010/main" val="3347032952"/>
-      </p:ext>
-    </p:extLst>
   </p:cSld>
   <p:clrMapOvr>
     <a:masterClrMapping/>
@@ -7925,7 +7775,7 @@
       </p:grpSpPr>
       <p:sp>
         <p:nvSpPr>
-          <p:cNvPr id="20" name="TextBox 19"/>
+          <p:cNvPr id="5" name="TextBox 4"/>
           <p:cNvSpPr txBox="1"/>
           <p:nvPr/>
         </p:nvSpPr>
@@ -7956,10 +7806,10 @@
                 <a:latin typeface="나눔고딕" pitchFamily="50" charset="-127"/>
                 <a:ea typeface="나눔고딕" pitchFamily="50" charset="-127"/>
               </a:rPr>
-              <a:t>2. </a:t>
-            </a:r>
-            <a:r>
-              <a:rPr lang="ko-KR" altLang="en-US" sz="800" spc="-30" dirty="0" err="1" smtClean="0">
+              <a:t>1.1 </a:t>
+            </a:r>
+            <a:r>
+              <a:rPr lang="ko-KR" altLang="en-US" sz="800" spc="-30" dirty="0" smtClean="0">
                 <a:solidFill>
                   <a:schemeClr val="tx1">
                     <a:lumMod val="95000"/>
@@ -7969,120 +7819,7 @@
                 <a:latin typeface="나눔고딕" pitchFamily="50" charset="-127"/>
                 <a:ea typeface="나눔고딕" pitchFamily="50" charset="-127"/>
               </a:rPr>
-              <a:t>유즈케이스도와</a:t>
-            </a:r>
-            <a:r>
-              <a:rPr lang="ko-KR" altLang="en-US" sz="800" spc="-30" dirty="0" smtClean="0">
-                <a:solidFill>
-                  <a:schemeClr val="tx1">
-                    <a:lumMod val="95000"/>
-                    <a:lumOff val="5000"/>
-                  </a:schemeClr>
-                </a:solidFill>
-                <a:latin typeface="나눔고딕" pitchFamily="50" charset="-127"/>
-                <a:ea typeface="나눔고딕" pitchFamily="50" charset="-127"/>
-              </a:rPr>
-              <a:t> 설명</a:t>
-            </a:r>
-            <a:endParaRPr lang="en-US" altLang="ko-KR" sz="800" spc="-30" dirty="0" smtClean="0">
-              <a:solidFill>
-                <a:schemeClr val="tx1">
-                  <a:lumMod val="95000"/>
-                  <a:lumOff val="5000"/>
-                </a:schemeClr>
-              </a:solidFill>
-              <a:latin typeface="나눔고딕" pitchFamily="50" charset="-127"/>
-              <a:ea typeface="나눔고딕" pitchFamily="50" charset="-127"/>
-            </a:endParaRPr>
-          </a:p>
-        </p:txBody>
-      </p:sp>
-      <p:cxnSp>
-        <p:nvCxnSpPr>
-          <p:cNvPr id="22" name="직선 연결선 21"/>
-          <p:cNvCxnSpPr/>
-          <p:nvPr/>
-        </p:nvCxnSpPr>
-        <p:spPr>
-          <a:xfrm>
-            <a:off x="364803" y="547859"/>
-            <a:ext cx="8406000" cy="0"/>
-          </a:xfrm>
-          <a:prstGeom prst="line">
-            <a:avLst/>
-          </a:prstGeom>
-          <a:ln w="3175">
-            <a:solidFill>
-              <a:schemeClr val="accent4">
-                <a:lumMod val="50000"/>
-              </a:schemeClr>
-            </a:solidFill>
-          </a:ln>
-        </p:spPr>
-        <p:style>
-          <a:lnRef idx="1">
-            <a:schemeClr val="accent1"/>
-          </a:lnRef>
-          <a:fillRef idx="0">
-            <a:schemeClr val="accent1"/>
-          </a:fillRef>
-          <a:effectRef idx="0">
-            <a:schemeClr val="accent1"/>
-          </a:effectRef>
-          <a:fontRef idx="minor">
-            <a:schemeClr val="tx1"/>
-          </a:fontRef>
-        </p:style>
-      </p:cxnSp>
-      <p:sp>
-        <p:nvSpPr>
-          <p:cNvPr id="28" name="TextBox 27"/>
-          <p:cNvSpPr txBox="1"/>
-          <p:nvPr/>
-        </p:nvSpPr>
-        <p:spPr>
-          <a:xfrm>
-            <a:off x="7277411" y="195231"/>
-            <a:ext cx="1584176" cy="215444"/>
-          </a:xfrm>
-          <a:prstGeom prst="rect">
-            <a:avLst/>
-          </a:prstGeom>
-          <a:noFill/>
-        </p:spPr>
-        <p:txBody>
-          <a:bodyPr wrap="square" rtlCol="0">
-            <a:spAutoFit/>
-          </a:bodyPr>
-          <a:lstStyle/>
-          <a:p>
-            <a:pPr algn="r"/>
-            <a:fld id="{DBA1376A-1BCE-4C3B-85BD-05D751D6B156}" type="slidenum">
-              <a:rPr lang="en-US" altLang="ko-KR" sz="800" spc="-30" smtClean="0">
-                <a:solidFill>
-                  <a:schemeClr val="tx1">
-                    <a:lumMod val="95000"/>
-                    <a:lumOff val="5000"/>
-                  </a:schemeClr>
-                </a:solidFill>
-                <a:latin typeface="나눔고딕" pitchFamily="50" charset="-127"/>
-                <a:ea typeface="나눔고딕" pitchFamily="50" charset="-127"/>
-              </a:rPr>
-              <a:pPr algn="r"/>
-              <a:t>4</a:t>
-            </a:fld>
-            <a:r>
-              <a:rPr lang="en-US" altLang="ko-KR" sz="800" spc="-30" dirty="0" smtClean="0">
-                <a:solidFill>
-                  <a:schemeClr val="tx1">
-                    <a:lumMod val="95000"/>
-                    <a:lumOff val="5000"/>
-                  </a:schemeClr>
-                </a:solidFill>
-                <a:latin typeface="나눔고딕" pitchFamily="50" charset="-127"/>
-                <a:ea typeface="나눔고딕" pitchFamily="50" charset="-127"/>
-              </a:rPr>
-              <a:t> / 14</a:t>
+              <a:t>프로젝트 소개</a:t>
             </a:r>
             <a:endParaRPr lang="en-US" altLang="ko-KR" sz="800" spc="-30" dirty="0">
               <a:solidFill>
@@ -8097,9 +7834,46 @@
           </a:p>
         </p:txBody>
       </p:sp>
+      <p:cxnSp>
+        <p:nvCxnSpPr>
+          <p:cNvPr id="20" name="직선 연결선 19"/>
+          <p:cNvCxnSpPr/>
+          <p:nvPr/>
+        </p:nvCxnSpPr>
+        <p:spPr>
+          <a:xfrm>
+            <a:off x="364803" y="547859"/>
+            <a:ext cx="8406000" cy="0"/>
+          </a:xfrm>
+          <a:prstGeom prst="line">
+            <a:avLst/>
+          </a:prstGeom>
+          <a:ln w="3175">
+            <a:solidFill>
+              <a:schemeClr val="accent4">
+                <a:lumMod val="50000"/>
+              </a:schemeClr>
+            </a:solidFill>
+          </a:ln>
+        </p:spPr>
+        <p:style>
+          <a:lnRef idx="1">
+            <a:schemeClr val="accent1"/>
+          </a:lnRef>
+          <a:fillRef idx="0">
+            <a:schemeClr val="accent1"/>
+          </a:fillRef>
+          <a:effectRef idx="0">
+            <a:schemeClr val="accent1"/>
+          </a:effectRef>
+          <a:fontRef idx="minor">
+            <a:schemeClr val="tx1"/>
+          </a:fontRef>
+        </p:style>
+      </p:cxnSp>
       <p:sp>
         <p:nvSpPr>
-          <p:cNvPr id="23" name="제목 22"/>
+          <p:cNvPr id="31" name="제목 1"/>
           <p:cNvSpPr>
             <a:spLocks noGrp="1"/>
           </p:cNvSpPr>
@@ -8109,49 +7883,440 @@
         </p:nvSpPr>
         <p:spPr>
           <a:xfrm>
-            <a:off x="247649" y="552449"/>
-            <a:ext cx="8486775" cy="855663"/>
+            <a:off x="256544" y="700126"/>
+            <a:ext cx="6995120" cy="580926"/>
           </a:xfrm>
         </p:spPr>
         <p:txBody>
-          <a:bodyPr/>
+          <a:bodyPr>
+            <a:noAutofit/>
+          </a:bodyPr>
           <a:lstStyle/>
           <a:p>
             <a:pPr algn="l"/>
             <a:r>
-              <a:rPr lang="ko-KR" altLang="en-US" sz="4000" b="1" spc="-150" dirty="0" err="1" smtClean="0">
-                <a:solidFill>
-                  <a:srgbClr val="1D314E"/>
-                </a:solidFill>
-              </a:rPr>
-              <a:t>유즈케이스</a:t>
-            </a:r>
-            <a:r>
-              <a:rPr lang="ko-KR" altLang="en-US" sz="4000" b="1" spc="-150" dirty="0" err="1">
-                <a:solidFill>
-                  <a:srgbClr val="1D314E"/>
-                </a:solidFill>
-              </a:rPr>
-              <a:t>도</a:t>
+              <a:rPr lang="ko-KR" altLang="en-US" sz="4000" b="1" spc="-150" dirty="0" smtClean="0">
+                <a:solidFill>
+                  <a:schemeClr val="accent4">
+                    <a:lumMod val="50000"/>
+                  </a:schemeClr>
+                </a:solidFill>
+              </a:rPr>
+              <a:t>프로젝트 소개</a:t>
             </a:r>
             <a:endParaRPr lang="ko-KR" altLang="en-US" sz="4000" b="1" spc="-150" dirty="0">
               <a:solidFill>
-                <a:srgbClr val="1D314E"/>
+                <a:schemeClr val="accent4">
+                  <a:lumMod val="50000"/>
+                </a:schemeClr>
               </a:solidFill>
+              <a:latin typeface="나눔고딕" pitchFamily="50" charset="-127"/>
+              <a:ea typeface="나눔고딕" pitchFamily="50" charset="-127"/>
             </a:endParaRPr>
+          </a:p>
+        </p:txBody>
+      </p:sp>
+      <p:sp>
+        <p:nvSpPr>
+          <p:cNvPr id="9" name="TextBox 8"/>
+          <p:cNvSpPr txBox="1"/>
+          <p:nvPr/>
+        </p:nvSpPr>
+        <p:spPr>
+          <a:xfrm>
+            <a:off x="7277411" y="195231"/>
+            <a:ext cx="1584176" cy="215444"/>
+          </a:xfrm>
+          <a:prstGeom prst="rect">
+            <a:avLst/>
+          </a:prstGeom>
+          <a:noFill/>
+        </p:spPr>
+        <p:txBody>
+          <a:bodyPr wrap="square" rtlCol="0">
+            <a:spAutoFit/>
+          </a:bodyPr>
+          <a:lstStyle/>
+          <a:p>
+            <a:pPr algn="r"/>
+            <a:fld id="{DBA1376A-1BCE-4C3B-85BD-05D751D6B156}" type="slidenum">
+              <a:rPr lang="en-US" altLang="ko-KR" sz="800" spc="-30" smtClean="0">
+                <a:solidFill>
+                  <a:schemeClr val="tx1">
+                    <a:lumMod val="95000"/>
+                    <a:lumOff val="5000"/>
+                  </a:schemeClr>
+                </a:solidFill>
+                <a:latin typeface="나눔고딕" pitchFamily="50" charset="-127"/>
+                <a:ea typeface="나눔고딕" pitchFamily="50" charset="-127"/>
+              </a:rPr>
+              <a:pPr algn="r"/>
+              <a:t>4</a:t>
+            </a:fld>
+            <a:r>
+              <a:rPr lang="en-US" altLang="ko-KR" sz="800" spc="-30" dirty="0" smtClean="0">
+                <a:solidFill>
+                  <a:schemeClr val="tx1">
+                    <a:lumMod val="95000"/>
+                    <a:lumOff val="5000"/>
+                  </a:schemeClr>
+                </a:solidFill>
+                <a:latin typeface="나눔고딕" pitchFamily="50" charset="-127"/>
+                <a:ea typeface="나눔고딕" pitchFamily="50" charset="-127"/>
+              </a:rPr>
+              <a:t> / 14</a:t>
+            </a:r>
+            <a:endParaRPr lang="en-US" altLang="ko-KR" sz="800" spc="-30" dirty="0">
+              <a:solidFill>
+                <a:schemeClr val="tx1">
+                  <a:lumMod val="95000"/>
+                  <a:lumOff val="5000"/>
+                </a:schemeClr>
+              </a:solidFill>
+              <a:latin typeface="나눔고딕" pitchFamily="50" charset="-127"/>
+              <a:ea typeface="나눔고딕" pitchFamily="50" charset="-127"/>
+            </a:endParaRPr>
+          </a:p>
+        </p:txBody>
+      </p:sp>
+      <p:sp>
+        <p:nvSpPr>
+          <p:cNvPr id="8" name="내용 개체 틀 2"/>
+          <p:cNvSpPr txBox="1">
+            <a:spLocks/>
+          </p:cNvSpPr>
+          <p:nvPr/>
+        </p:nvSpPr>
+        <p:spPr>
+          <a:xfrm>
+            <a:off x="259795" y="1631109"/>
+            <a:ext cx="8470547" cy="1275443"/>
+          </a:xfrm>
+          <a:prstGeom prst="rect">
+            <a:avLst/>
+          </a:prstGeom>
+        </p:spPr>
+        <p:txBody>
+          <a:bodyPr vert="horz" lIns="91440" tIns="45720" rIns="91440" bIns="45720" rtlCol="0">
+            <a:normAutofit/>
+          </a:bodyPr>
+          <a:lstStyle>
+            <a:lvl1pPr marL="342900" indent="-342900" algn="l" defTabSz="914400" rtl="0" eaLnBrk="1" latinLnBrk="1" hangingPunct="1">
+              <a:spcBef>
+                <a:spcPct val="20000"/>
+              </a:spcBef>
+              <a:buFont typeface="Arial" pitchFamily="34" charset="0"/>
+              <a:buChar char="•"/>
+              <a:defRPr sz="3200" kern="1200">
+                <a:solidFill>
+                  <a:schemeClr val="tx1"/>
+                </a:solidFill>
+                <a:latin typeface="+mn-lt"/>
+                <a:ea typeface="+mn-ea"/>
+                <a:cs typeface="+mn-cs"/>
+              </a:defRPr>
+            </a:lvl1pPr>
+            <a:lvl2pPr marL="742950" indent="-285750" algn="l" defTabSz="914400" rtl="0" eaLnBrk="1" latinLnBrk="1" hangingPunct="1">
+              <a:spcBef>
+                <a:spcPct val="20000"/>
+              </a:spcBef>
+              <a:buFont typeface="Arial" pitchFamily="34" charset="0"/>
+              <a:buChar char="–"/>
+              <a:defRPr sz="2800" kern="1200">
+                <a:solidFill>
+                  <a:schemeClr val="tx1"/>
+                </a:solidFill>
+                <a:latin typeface="+mn-lt"/>
+                <a:ea typeface="+mn-ea"/>
+                <a:cs typeface="+mn-cs"/>
+              </a:defRPr>
+            </a:lvl2pPr>
+            <a:lvl3pPr marL="1143000" indent="-228600" algn="l" defTabSz="914400" rtl="0" eaLnBrk="1" latinLnBrk="1" hangingPunct="1">
+              <a:spcBef>
+                <a:spcPct val="20000"/>
+              </a:spcBef>
+              <a:buFont typeface="Arial" pitchFamily="34" charset="0"/>
+              <a:buChar char="•"/>
+              <a:defRPr sz="2400" kern="1200">
+                <a:solidFill>
+                  <a:schemeClr val="tx1"/>
+                </a:solidFill>
+                <a:latin typeface="+mn-lt"/>
+                <a:ea typeface="+mn-ea"/>
+                <a:cs typeface="+mn-cs"/>
+              </a:defRPr>
+            </a:lvl3pPr>
+            <a:lvl4pPr marL="1600200" indent="-228600" algn="l" defTabSz="914400" rtl="0" eaLnBrk="1" latinLnBrk="1" hangingPunct="1">
+              <a:spcBef>
+                <a:spcPct val="20000"/>
+              </a:spcBef>
+              <a:buFont typeface="Arial" pitchFamily="34" charset="0"/>
+              <a:buChar char="–"/>
+              <a:defRPr sz="2000" kern="1200">
+                <a:solidFill>
+                  <a:schemeClr val="tx1"/>
+                </a:solidFill>
+                <a:latin typeface="+mn-lt"/>
+                <a:ea typeface="+mn-ea"/>
+                <a:cs typeface="+mn-cs"/>
+              </a:defRPr>
+            </a:lvl4pPr>
+            <a:lvl5pPr marL="2057400" indent="-228600" algn="l" defTabSz="914400" rtl="0" eaLnBrk="1" latinLnBrk="1" hangingPunct="1">
+              <a:spcBef>
+                <a:spcPct val="20000"/>
+              </a:spcBef>
+              <a:buFont typeface="Arial" pitchFamily="34" charset="0"/>
+              <a:buChar char="»"/>
+              <a:defRPr sz="2000" kern="1200">
+                <a:solidFill>
+                  <a:schemeClr val="tx1"/>
+                </a:solidFill>
+                <a:latin typeface="+mn-lt"/>
+                <a:ea typeface="+mn-ea"/>
+                <a:cs typeface="+mn-cs"/>
+              </a:defRPr>
+            </a:lvl5pPr>
+            <a:lvl6pPr marL="2514600" indent="-228600" algn="l" defTabSz="914400" rtl="0" eaLnBrk="1" latinLnBrk="1" hangingPunct="1">
+              <a:spcBef>
+                <a:spcPct val="20000"/>
+              </a:spcBef>
+              <a:buFont typeface="Arial" pitchFamily="34" charset="0"/>
+              <a:buChar char="•"/>
+              <a:defRPr sz="2000" kern="1200">
+                <a:solidFill>
+                  <a:schemeClr val="tx1"/>
+                </a:solidFill>
+                <a:latin typeface="+mn-lt"/>
+                <a:ea typeface="+mn-ea"/>
+                <a:cs typeface="+mn-cs"/>
+              </a:defRPr>
+            </a:lvl6pPr>
+            <a:lvl7pPr marL="2971800" indent="-228600" algn="l" defTabSz="914400" rtl="0" eaLnBrk="1" latinLnBrk="1" hangingPunct="1">
+              <a:spcBef>
+                <a:spcPct val="20000"/>
+              </a:spcBef>
+              <a:buFont typeface="Arial" pitchFamily="34" charset="0"/>
+              <a:buChar char="•"/>
+              <a:defRPr sz="2000" kern="1200">
+                <a:solidFill>
+                  <a:schemeClr val="tx1"/>
+                </a:solidFill>
+                <a:latin typeface="+mn-lt"/>
+                <a:ea typeface="+mn-ea"/>
+                <a:cs typeface="+mn-cs"/>
+              </a:defRPr>
+            </a:lvl7pPr>
+            <a:lvl8pPr marL="3429000" indent="-228600" algn="l" defTabSz="914400" rtl="0" eaLnBrk="1" latinLnBrk="1" hangingPunct="1">
+              <a:spcBef>
+                <a:spcPct val="20000"/>
+              </a:spcBef>
+              <a:buFont typeface="Arial" pitchFamily="34" charset="0"/>
+              <a:buChar char="•"/>
+              <a:defRPr sz="2000" kern="1200">
+                <a:solidFill>
+                  <a:schemeClr val="tx1"/>
+                </a:solidFill>
+                <a:latin typeface="+mn-lt"/>
+                <a:ea typeface="+mn-ea"/>
+                <a:cs typeface="+mn-cs"/>
+              </a:defRPr>
+            </a:lvl8pPr>
+            <a:lvl9pPr marL="3886200" indent="-228600" algn="l" defTabSz="914400" rtl="0" eaLnBrk="1" latinLnBrk="1" hangingPunct="1">
+              <a:spcBef>
+                <a:spcPct val="20000"/>
+              </a:spcBef>
+              <a:buFont typeface="Arial" pitchFamily="34" charset="0"/>
+              <a:buChar char="•"/>
+              <a:defRPr sz="2000" kern="1200">
+                <a:solidFill>
+                  <a:schemeClr val="tx1"/>
+                </a:solidFill>
+                <a:latin typeface="+mn-lt"/>
+                <a:ea typeface="+mn-ea"/>
+                <a:cs typeface="+mn-cs"/>
+              </a:defRPr>
+            </a:lvl9pPr>
+          </a:lstStyle>
+          <a:p>
+            <a:pPr marL="0" indent="0">
+              <a:buFont typeface="Arial" pitchFamily="34" charset="0"/>
+              <a:buNone/>
+            </a:pPr>
+            <a:r>
+              <a:rPr lang="en-US" altLang="ko-KR" sz="1200" b="1" dirty="0">
+                <a:solidFill>
+                  <a:srgbClr val="3D3C3E"/>
+                </a:solidFill>
+                <a:latin typeface="나눔고딕" pitchFamily="50" charset="-127"/>
+                <a:ea typeface="나눔고딕" pitchFamily="50" charset="-127"/>
+              </a:rPr>
+              <a:t> </a:t>
+            </a:r>
+            <a:r>
+              <a:rPr lang="en-US" altLang="ko-KR" sz="1200" b="1" dirty="0" smtClean="0">
+                <a:solidFill>
+                  <a:srgbClr val="3D3C3E"/>
+                </a:solidFill>
+                <a:latin typeface="나눔고딕" pitchFamily="50" charset="-127"/>
+                <a:ea typeface="나눔고딕" pitchFamily="50" charset="-127"/>
+              </a:rPr>
+              <a:t> Sim</a:t>
+            </a:r>
+            <a:r>
+              <a:rPr lang="ko-KR" altLang="en-US" sz="1200" b="1" dirty="0" smtClean="0">
+                <a:solidFill>
+                  <a:srgbClr val="3D3C3E"/>
+                </a:solidFill>
+                <a:latin typeface="나눔고딕" pitchFamily="50" charset="-127"/>
+                <a:ea typeface="나눔고딕" pitchFamily="50" charset="-127"/>
+              </a:rPr>
+              <a:t>을 재사용하되 재난 지역에 대한 정보가 부족한 상태에서</a:t>
+            </a:r>
+            <a:endParaRPr lang="en-US" altLang="ko-KR" sz="1200" b="1" dirty="0" smtClean="0">
+              <a:solidFill>
+                <a:srgbClr val="3D3C3E"/>
+              </a:solidFill>
+              <a:latin typeface="나눔고딕" pitchFamily="50" charset="-127"/>
+              <a:ea typeface="나눔고딕" pitchFamily="50" charset="-127"/>
+            </a:endParaRPr>
+          </a:p>
+          <a:p>
+            <a:pPr marL="0" indent="0">
+              <a:buFont typeface="Arial" pitchFamily="34" charset="0"/>
+              <a:buNone/>
+            </a:pPr>
+            <a:r>
+              <a:rPr lang="ko-KR" altLang="en-US" sz="1200" b="1" dirty="0" smtClean="0">
+                <a:solidFill>
+                  <a:srgbClr val="3D3C3E"/>
+                </a:solidFill>
+                <a:latin typeface="나눔고딕" pitchFamily="50" charset="-127"/>
+                <a:ea typeface="나눔고딕" pitchFamily="50" charset="-127"/>
+              </a:rPr>
+              <a:t>로봇의 동작을 자동으로 제어할 수 있도록 하는 시스템인 </a:t>
+            </a:r>
+            <a:endParaRPr lang="en-US" altLang="ko-KR" sz="1200" b="1" dirty="0" smtClean="0">
+              <a:solidFill>
+                <a:srgbClr val="3D3C3E"/>
+              </a:solidFill>
+              <a:latin typeface="나눔고딕" pitchFamily="50" charset="-127"/>
+              <a:ea typeface="나눔고딕" pitchFamily="50" charset="-127"/>
+            </a:endParaRPr>
+          </a:p>
+          <a:p>
+            <a:pPr marL="0" indent="0">
+              <a:buFont typeface="Arial" pitchFamily="34" charset="0"/>
+              <a:buNone/>
+            </a:pPr>
+            <a:r>
+              <a:rPr lang="en-US" altLang="ko-KR" sz="1200" b="1" dirty="0" smtClean="0">
+                <a:solidFill>
+                  <a:srgbClr val="3D3C3E"/>
+                </a:solidFill>
+                <a:latin typeface="나눔고딕" pitchFamily="50" charset="-127"/>
+                <a:ea typeface="나눔고딕" pitchFamily="50" charset="-127"/>
+              </a:rPr>
+              <a:t>ADD-ON(Additional </a:t>
+            </a:r>
+            <a:r>
+              <a:rPr lang="en-US" altLang="ko-KR" sz="1200" b="1" dirty="0" err="1" smtClean="0">
+                <a:solidFill>
+                  <a:srgbClr val="3D3C3E"/>
+                </a:solidFill>
+                <a:latin typeface="나눔고딕" pitchFamily="50" charset="-127"/>
+                <a:ea typeface="나눔고딕" pitchFamily="50" charset="-127"/>
+              </a:rPr>
+              <a:t>Moblie</a:t>
+            </a:r>
+            <a:r>
+              <a:rPr lang="en-US" altLang="ko-KR" sz="1200" b="1" dirty="0" smtClean="0">
+                <a:solidFill>
+                  <a:srgbClr val="3D3C3E"/>
+                </a:solidFill>
+                <a:latin typeface="나눔고딕" pitchFamily="50" charset="-127"/>
+                <a:ea typeface="나눔고딕" pitchFamily="50" charset="-127"/>
+              </a:rPr>
+              <a:t> Robot Controller) </a:t>
+            </a:r>
+            <a:r>
+              <a:rPr lang="ko-KR" altLang="en-US" sz="1200" b="1" dirty="0" smtClean="0">
+                <a:solidFill>
+                  <a:srgbClr val="3D3C3E"/>
+                </a:solidFill>
+                <a:latin typeface="나눔고딕" pitchFamily="50" charset="-127"/>
+                <a:ea typeface="나눔고딕" pitchFamily="50" charset="-127"/>
+              </a:rPr>
+              <a:t>시스템</a:t>
+            </a:r>
+            <a:r>
+              <a:rPr lang="en-US" altLang="ko-KR" sz="1200" b="1" dirty="0" smtClean="0">
+                <a:solidFill>
+                  <a:srgbClr val="3D3C3E"/>
+                </a:solidFill>
+                <a:latin typeface="나눔고딕" pitchFamily="50" charset="-127"/>
+                <a:ea typeface="나눔고딕" pitchFamily="50" charset="-127"/>
+              </a:rPr>
+              <a:t>.</a:t>
+            </a:r>
+            <a:endParaRPr lang="ko-KR" altLang="en-US" sz="1200" dirty="0" smtClean="0">
+              <a:solidFill>
+                <a:srgbClr val="3D3C3E"/>
+              </a:solidFill>
+              <a:latin typeface="나눔고딕" pitchFamily="50" charset="-127"/>
+              <a:ea typeface="나눔고딕" pitchFamily="50" charset="-127"/>
+            </a:endParaRPr>
+          </a:p>
+        </p:txBody>
+      </p:sp>
+      <p:sp>
+        <p:nvSpPr>
+          <p:cNvPr id="2" name="AutoShape 2" descr="robot에 대한 이미지 검색결과"/>
+          <p:cNvSpPr>
+            <a:spLocks noChangeAspect="1" noChangeArrowheads="1"/>
+          </p:cNvSpPr>
+          <p:nvPr/>
+        </p:nvSpPr>
+        <p:spPr bwMode="auto">
+          <a:xfrm>
+            <a:off x="155575" y="-144463"/>
+            <a:ext cx="304800" cy="304801"/>
+          </a:xfrm>
+          <a:prstGeom prst="rect">
+            <a:avLst/>
+          </a:prstGeom>
+          <a:noFill/>
+          <a:extLst>
+            <a:ext uri="{909E8E84-426E-40DD-AFC4-6F175D3DCCD1}">
+              <a14:hiddenFill xmlns:a14="http://schemas.microsoft.com/office/drawing/2010/main">
+                <a:solidFill>
+                  <a:srgbClr val="FFFFFF"/>
+                </a:solidFill>
+              </a14:hiddenFill>
+            </a:ext>
+          </a:extLst>
+        </p:spPr>
+        <p:txBody>
+          <a:bodyPr vert="horz" wrap="square" lIns="91440" tIns="45720" rIns="91440" bIns="45720" numCol="1" anchor="t" anchorCtr="0" compatLnSpc="1">
+            <a:prstTxWarp prst="textNoShape">
+              <a:avLst/>
+            </a:prstTxWarp>
+          </a:bodyPr>
+          <a:lstStyle/>
+          <a:p>
+            <a:endParaRPr lang="ko-KR" altLang="en-US"/>
           </a:p>
         </p:txBody>
       </p:sp>
       <p:pic>
         <p:nvPicPr>
-          <p:cNvPr id="2" name="그림 1"/>
+          <p:cNvPr id="3" name="그림 2"/>
           <p:cNvPicPr>
             <a:picLocks noChangeAspect="1"/>
           </p:cNvPicPr>
           <p:nvPr/>
         </p:nvPicPr>
         <p:blipFill>
-          <a:blip r:embed="rId2">
+          <a:blip r:embed="rId3">
             <a:extLst>
               <a:ext uri="{28A0092B-C50C-407E-A947-70E740481C1C}">
                 <a14:useLocalDpi xmlns:a14="http://schemas.microsoft.com/office/drawing/2010/main" val="0"/>
@@ -8164,8 +8329,8 @@
         </p:blipFill>
         <p:spPr>
           <a:xfrm>
-            <a:off x="1395535" y="1903187"/>
-            <a:ext cx="6344535" cy="3905795"/>
+            <a:off x="2722057" y="2661556"/>
+            <a:ext cx="3546021" cy="3546021"/>
           </a:xfrm>
           <a:prstGeom prst="rect">
             <a:avLst/>
@@ -8175,7 +8340,7 @@
     </p:spTree>
     <p:extLst>
       <p:ext uri="{BB962C8B-B14F-4D97-AF65-F5344CB8AC3E}">
-        <p14:creationId xmlns:p14="http://schemas.microsoft.com/office/powerpoint/2010/main" val="3063464805"/>
+        <p14:creationId xmlns:p14="http://schemas.microsoft.com/office/powerpoint/2010/main" val="3347032952"/>
       </p:ext>
     </p:extLst>
   </p:cSld>
@@ -8405,20 +8570,20 @@
           <a:p>
             <a:pPr algn="l"/>
             <a:r>
-              <a:rPr lang="en-US" altLang="ko-KR" sz="4000" b="1" spc="-150" dirty="0" smtClean="0">
+              <a:rPr lang="ko-KR" altLang="en-US" sz="4000" b="1" spc="-150" dirty="0" err="1" smtClean="0">
                 <a:solidFill>
                   <a:srgbClr val="1D314E"/>
                 </a:solidFill>
               </a:rPr>
-              <a:t>“Input Map Data” </a:t>
-            </a:r>
-            <a:r>
-              <a:rPr lang="ko-KR" altLang="en-US" sz="4000" b="1" spc="-150" dirty="0" smtClean="0">
+              <a:t>유즈케이스</a:t>
+            </a:r>
+            <a:r>
+              <a:rPr lang="ko-KR" altLang="en-US" sz="4000" b="1" spc="-150" dirty="0" err="1">
                 <a:solidFill>
                   <a:srgbClr val="1D314E"/>
                 </a:solidFill>
               </a:rPr>
-              <a:t>시나리오</a:t>
+              <a:t>도</a:t>
             </a:r>
             <a:endParaRPr lang="ko-KR" altLang="en-US" sz="4000" b="1" spc="-150" dirty="0">
               <a:solidFill>
@@ -8430,7 +8595,7 @@
       </p:sp>
       <p:pic>
         <p:nvPicPr>
-          <p:cNvPr id="3" name="그림 2"/>
+          <p:cNvPr id="2" name="그림 1"/>
           <p:cNvPicPr>
             <a:picLocks noChangeAspect="1"/>
           </p:cNvPicPr>
@@ -8450,8 +8615,8 @@
         </p:blipFill>
         <p:spPr>
           <a:xfrm>
-            <a:off x="2548178" y="1408112"/>
-            <a:ext cx="3682884" cy="5190643"/>
+            <a:off x="1395535" y="1903187"/>
+            <a:ext cx="6344535" cy="3905795"/>
           </a:xfrm>
           <a:prstGeom prst="rect">
             <a:avLst/>
@@ -8461,7 +8626,7 @@
     </p:spTree>
     <p:extLst>
       <p:ext uri="{BB962C8B-B14F-4D97-AF65-F5344CB8AC3E}">
-        <p14:creationId xmlns:p14="http://schemas.microsoft.com/office/powerpoint/2010/main" val="1883546668"/>
+        <p14:creationId xmlns:p14="http://schemas.microsoft.com/office/powerpoint/2010/main" val="3063464805"/>
       </p:ext>
     </p:extLst>
   </p:cSld>
@@ -8696,7 +8861,7 @@
                   <a:srgbClr val="1D314E"/>
                 </a:solidFill>
               </a:rPr>
-              <a:t>“Run Robot Searching”</a:t>
+              <a:t>“Input Map Data” </a:t>
             </a:r>
             <a:r>
               <a:rPr lang="ko-KR" altLang="en-US" sz="4000" b="1" spc="-150" dirty="0" smtClean="0">
@@ -8704,7 +8869,7 @@
                   <a:srgbClr val="1D314E"/>
                 </a:solidFill>
               </a:rPr>
-              <a:t> 시나리오</a:t>
+              <a:t>시나리오</a:t>
             </a:r>
             <a:endParaRPr lang="ko-KR" altLang="en-US" sz="4000" b="1" spc="-150" dirty="0">
               <a:solidFill>
@@ -8716,7 +8881,7 @@
       </p:sp>
       <p:pic>
         <p:nvPicPr>
-          <p:cNvPr id="2" name="그림 1"/>
+          <p:cNvPr id="3" name="그림 2"/>
           <p:cNvPicPr>
             <a:picLocks noChangeAspect="1"/>
           </p:cNvPicPr>
@@ -8736,8 +8901,8 @@
         </p:blipFill>
         <p:spPr>
           <a:xfrm>
-            <a:off x="2638165" y="1881508"/>
-            <a:ext cx="3705742" cy="3982006"/>
+            <a:off x="2548178" y="1408112"/>
+            <a:ext cx="3682884" cy="5190643"/>
           </a:xfrm>
           <a:prstGeom prst="rect">
             <a:avLst/>
@@ -8747,7 +8912,7 @@
     </p:spTree>
     <p:extLst>
       <p:ext uri="{BB962C8B-B14F-4D97-AF65-F5344CB8AC3E}">
-        <p14:creationId xmlns:p14="http://schemas.microsoft.com/office/powerpoint/2010/main" val="2047853414"/>
+        <p14:creationId xmlns:p14="http://schemas.microsoft.com/office/powerpoint/2010/main" val="1883546668"/>
       </p:ext>
     </p:extLst>
   </p:cSld>
@@ -8977,12 +9142,12 @@
           <a:p>
             <a:pPr algn="l"/>
             <a:r>
-              <a:rPr lang="ko-KR" altLang="en-US" sz="4000" b="1" spc="-150" dirty="0" err="1" smtClean="0">
+              <a:rPr lang="en-US" altLang="ko-KR" sz="4000" b="1" spc="-150" dirty="0" smtClean="0">
                 <a:solidFill>
                   <a:srgbClr val="1D314E"/>
                 </a:solidFill>
               </a:rPr>
-              <a:t>유즈케이스별</a:t>
+              <a:t>“Run Robot Searching”</a:t>
             </a:r>
             <a:r>
               <a:rPr lang="ko-KR" altLang="en-US" sz="4000" b="1" spc="-150" dirty="0" smtClean="0">
@@ -9002,7 +9167,7 @@
       </p:sp>
       <p:pic>
         <p:nvPicPr>
-          <p:cNvPr id="3" name="그림 2"/>
+          <p:cNvPr id="2" name="그림 1"/>
           <p:cNvPicPr>
             <a:picLocks noChangeAspect="1"/>
           </p:cNvPicPr>
@@ -9022,68 +9187,8 @@
         </p:blipFill>
         <p:spPr>
           <a:xfrm>
-            <a:off x="412135" y="2799462"/>
-            <a:ext cx="2243458" cy="1764853"/>
-          </a:xfrm>
-          <a:prstGeom prst="rect">
-            <a:avLst/>
-          </a:prstGeom>
-        </p:spPr>
-      </p:pic>
-      <p:pic>
-        <p:nvPicPr>
-          <p:cNvPr id="4" name="그림 3"/>
-          <p:cNvPicPr>
-            <a:picLocks noChangeAspect="1"/>
-          </p:cNvPicPr>
-          <p:nvPr/>
-        </p:nvPicPr>
-        <p:blipFill>
-          <a:blip r:embed="rId3">
-            <a:extLst>
-              <a:ext uri="{28A0092B-C50C-407E-A947-70E740481C1C}">
-                <a14:useLocalDpi xmlns:a14="http://schemas.microsoft.com/office/drawing/2010/main" val="0"/>
-              </a:ext>
-            </a:extLst>
-          </a:blip>
-          <a:stretch>
-            <a:fillRect/>
-          </a:stretch>
-        </p:blipFill>
-        <p:spPr>
-          <a:xfrm>
-            <a:off x="3180798" y="2799463"/>
-            <a:ext cx="2191056" cy="1743318"/>
-          </a:xfrm>
-          <a:prstGeom prst="rect">
-            <a:avLst/>
-          </a:prstGeom>
-        </p:spPr>
-      </p:pic>
-      <p:pic>
-        <p:nvPicPr>
-          <p:cNvPr id="5" name="그림 4"/>
-          <p:cNvPicPr>
-            <a:picLocks noChangeAspect="1"/>
-          </p:cNvPicPr>
-          <p:nvPr/>
-        </p:nvPicPr>
-        <p:blipFill>
-          <a:blip r:embed="rId4">
-            <a:extLst>
-              <a:ext uri="{28A0092B-C50C-407E-A947-70E740481C1C}">
-                <a14:useLocalDpi xmlns:a14="http://schemas.microsoft.com/office/drawing/2010/main" val="0"/>
-              </a:ext>
-            </a:extLst>
-          </a:blip>
-          <a:stretch>
-            <a:fillRect/>
-          </a:stretch>
-        </p:blipFill>
-        <p:spPr>
-          <a:xfrm>
-            <a:off x="5786399" y="2799463"/>
-            <a:ext cx="2892898" cy="1743318"/>
+            <a:off x="2638165" y="1881508"/>
+            <a:ext cx="3705742" cy="3982006"/>
           </a:xfrm>
           <a:prstGeom prst="rect">
             <a:avLst/>
@@ -9093,7 +9198,7 @@
     </p:spTree>
     <p:extLst>
       <p:ext uri="{BB962C8B-B14F-4D97-AF65-F5344CB8AC3E}">
-        <p14:creationId xmlns:p14="http://schemas.microsoft.com/office/powerpoint/2010/main" val="3866808634"/>
+        <p14:creationId xmlns:p14="http://schemas.microsoft.com/office/powerpoint/2010/main" val="2047853414"/>
       </p:ext>
     </p:extLst>
   </p:cSld>
@@ -9160,10 +9265,10 @@
                 <a:latin typeface="나눔고딕" pitchFamily="50" charset="-127"/>
                 <a:ea typeface="나눔고딕" pitchFamily="50" charset="-127"/>
               </a:rPr>
-              <a:t>3. </a:t>
-            </a:r>
-            <a:r>
-              <a:rPr lang="ko-KR" altLang="en-US" sz="800" spc="-30" dirty="0" smtClean="0">
+              <a:t>2. </a:t>
+            </a:r>
+            <a:r>
+              <a:rPr lang="ko-KR" altLang="en-US" sz="800" spc="-30" dirty="0" err="1" smtClean="0">
                 <a:solidFill>
                   <a:schemeClr val="tx1">
                     <a:lumMod val="95000"/>
@@ -9173,10 +9278,10 @@
                 <a:latin typeface="나눔고딕" pitchFamily="50" charset="-127"/>
                 <a:ea typeface="나눔고딕" pitchFamily="50" charset="-127"/>
               </a:rPr>
-              <a:t>전체  </a:t>
-            </a:r>
-            <a:r>
-              <a:rPr lang="ko-KR" altLang="en-US" sz="800" spc="-30" dirty="0" err="1" smtClean="0">
+              <a:t>유즈케이스도와</a:t>
+            </a:r>
+            <a:r>
+              <a:rPr lang="ko-KR" altLang="en-US" sz="800" spc="-30" dirty="0" smtClean="0">
                 <a:solidFill>
                   <a:schemeClr val="tx1">
                     <a:lumMod val="95000"/>
@@ -9186,7 +9291,7 @@
                 <a:latin typeface="나눔고딕" pitchFamily="50" charset="-127"/>
                 <a:ea typeface="나눔고딕" pitchFamily="50" charset="-127"/>
               </a:rPr>
-              <a:t>액티비티도</a:t>
+              <a:t> 설명</a:t>
             </a:r>
             <a:endParaRPr lang="en-US" altLang="ko-KR" sz="800" spc="-30" dirty="0" smtClean="0">
               <a:solidFill>
@@ -9323,20 +9428,20 @@
           <a:p>
             <a:pPr algn="l"/>
             <a:r>
+              <a:rPr lang="ko-KR" altLang="en-US" sz="4000" b="1" spc="-150" dirty="0" err="1" smtClean="0">
+                <a:solidFill>
+                  <a:srgbClr val="1D314E"/>
+                </a:solidFill>
+              </a:rPr>
+              <a:t>유즈케이스별</a:t>
+            </a:r>
+            <a:r>
               <a:rPr lang="ko-KR" altLang="en-US" sz="4000" b="1" spc="-150" dirty="0" smtClean="0">
                 <a:solidFill>
                   <a:srgbClr val="1D314E"/>
                 </a:solidFill>
               </a:rPr>
-              <a:t>전체 </a:t>
-            </a:r>
-            <a:r>
-              <a:rPr lang="ko-KR" altLang="en-US" sz="4000" b="1" spc="-150" dirty="0" err="1" smtClean="0">
-                <a:solidFill>
-                  <a:srgbClr val="1D314E"/>
-                </a:solidFill>
-              </a:rPr>
-              <a:t>액티비티도</a:t>
+              <a:t> 시나리오</a:t>
             </a:r>
             <a:endParaRPr lang="ko-KR" altLang="en-US" sz="4000" b="1" spc="-150" dirty="0">
               <a:solidFill>
@@ -9368,8 +9473,68 @@
         </p:blipFill>
         <p:spPr>
           <a:xfrm>
-            <a:off x="1686088" y="1408112"/>
-            <a:ext cx="5763429" cy="5315692"/>
+            <a:off x="412135" y="2799462"/>
+            <a:ext cx="2243458" cy="1764853"/>
+          </a:xfrm>
+          <a:prstGeom prst="rect">
+            <a:avLst/>
+          </a:prstGeom>
+        </p:spPr>
+      </p:pic>
+      <p:pic>
+        <p:nvPicPr>
+          <p:cNvPr id="4" name="그림 3"/>
+          <p:cNvPicPr>
+            <a:picLocks noChangeAspect="1"/>
+          </p:cNvPicPr>
+          <p:nvPr/>
+        </p:nvPicPr>
+        <p:blipFill>
+          <a:blip r:embed="rId3">
+            <a:extLst>
+              <a:ext uri="{28A0092B-C50C-407E-A947-70E740481C1C}">
+                <a14:useLocalDpi xmlns:a14="http://schemas.microsoft.com/office/drawing/2010/main" val="0"/>
+              </a:ext>
+            </a:extLst>
+          </a:blip>
+          <a:stretch>
+            <a:fillRect/>
+          </a:stretch>
+        </p:blipFill>
+        <p:spPr>
+          <a:xfrm>
+            <a:off x="3180798" y="2799463"/>
+            <a:ext cx="2191056" cy="1743318"/>
+          </a:xfrm>
+          <a:prstGeom prst="rect">
+            <a:avLst/>
+          </a:prstGeom>
+        </p:spPr>
+      </p:pic>
+      <p:pic>
+        <p:nvPicPr>
+          <p:cNvPr id="5" name="그림 4"/>
+          <p:cNvPicPr>
+            <a:picLocks noChangeAspect="1"/>
+          </p:cNvPicPr>
+          <p:nvPr/>
+        </p:nvPicPr>
+        <p:blipFill>
+          <a:blip r:embed="rId4">
+            <a:extLst>
+              <a:ext uri="{28A0092B-C50C-407E-A947-70E740481C1C}">
+                <a14:useLocalDpi xmlns:a14="http://schemas.microsoft.com/office/drawing/2010/main" val="0"/>
+              </a:ext>
+            </a:extLst>
+          </a:blip>
+          <a:stretch>
+            <a:fillRect/>
+          </a:stretch>
+        </p:blipFill>
+        <p:spPr>
+          <a:xfrm>
+            <a:off x="5786399" y="2799463"/>
+            <a:ext cx="2892898" cy="1743318"/>
           </a:xfrm>
           <a:prstGeom prst="rect">
             <a:avLst/>
@@ -9379,7 +9544,7 @@
     </p:spTree>
     <p:extLst>
       <p:ext uri="{BB962C8B-B14F-4D97-AF65-F5344CB8AC3E}">
-        <p14:creationId xmlns:p14="http://schemas.microsoft.com/office/powerpoint/2010/main" val="3277018044"/>
+        <p14:creationId xmlns:p14="http://schemas.microsoft.com/office/powerpoint/2010/main" val="3866808634"/>
       </p:ext>
     </p:extLst>
   </p:cSld>
@@ -9446,10 +9611,10 @@
                 <a:latin typeface="나눔고딕" pitchFamily="50" charset="-127"/>
                 <a:ea typeface="나눔고딕" pitchFamily="50" charset="-127"/>
               </a:rPr>
-              <a:t>4. </a:t>
-            </a:r>
-            <a:r>
-              <a:rPr lang="ko-KR" altLang="en-US" sz="800" spc="-30" dirty="0" err="1" smtClean="0">
+              <a:t>3. </a:t>
+            </a:r>
+            <a:r>
+              <a:rPr lang="ko-KR" altLang="en-US" sz="800" spc="-30" dirty="0" smtClean="0">
                 <a:solidFill>
                   <a:schemeClr val="tx1">
                     <a:lumMod val="95000"/>
@@ -9459,7 +9624,20 @@
                 <a:latin typeface="나눔고딕" pitchFamily="50" charset="-127"/>
                 <a:ea typeface="나눔고딕" pitchFamily="50" charset="-127"/>
               </a:rPr>
-              <a:t>아키텍쳐도</a:t>
+              <a:t>전체  </a:t>
+            </a:r>
+            <a:r>
+              <a:rPr lang="ko-KR" altLang="en-US" sz="800" spc="-30" dirty="0" err="1" smtClean="0">
+                <a:solidFill>
+                  <a:schemeClr val="tx1">
+                    <a:lumMod val="95000"/>
+                    <a:lumOff val="5000"/>
+                  </a:schemeClr>
+                </a:solidFill>
+                <a:latin typeface="나눔고딕" pitchFamily="50" charset="-127"/>
+                <a:ea typeface="나눔고딕" pitchFamily="50" charset="-127"/>
+              </a:rPr>
+              <a:t>액티비티도</a:t>
             </a:r>
             <a:endParaRPr lang="en-US" altLang="ko-KR" sz="800" spc="-30" dirty="0" smtClean="0">
               <a:solidFill>
@@ -9596,12 +9774,20 @@
           <a:p>
             <a:pPr algn="l"/>
             <a:r>
+              <a:rPr lang="ko-KR" altLang="en-US" sz="4000" b="1" spc="-150" dirty="0" smtClean="0">
+                <a:solidFill>
+                  <a:srgbClr val="1D314E"/>
+                </a:solidFill>
+              </a:rPr>
+              <a:t>전체 </a:t>
+            </a:r>
+            <a:r>
               <a:rPr lang="ko-KR" altLang="en-US" sz="4000" b="1" spc="-150" dirty="0" err="1" smtClean="0">
                 <a:solidFill>
                   <a:srgbClr val="1D314E"/>
                 </a:solidFill>
               </a:rPr>
-              <a:t>아키텍쳐도</a:t>
+              <a:t>액티비티도</a:t>
             </a:r>
             <a:endParaRPr lang="ko-KR" altLang="en-US" sz="4000" b="1" spc="-150" dirty="0">
               <a:solidFill>
@@ -9613,7 +9799,7 @@
       </p:sp>
       <p:pic>
         <p:nvPicPr>
-          <p:cNvPr id="2" name="그림 1"/>
+          <p:cNvPr id="3" name="그림 2"/>
           <p:cNvPicPr>
             <a:picLocks noChangeAspect="1"/>
           </p:cNvPicPr>
@@ -9633,8 +9819,8 @@
         </p:blipFill>
         <p:spPr>
           <a:xfrm>
-            <a:off x="1514318" y="2530429"/>
-            <a:ext cx="6115364" cy="1797142"/>
+            <a:off x="1686088" y="1408112"/>
+            <a:ext cx="5763429" cy="5315692"/>
           </a:xfrm>
           <a:prstGeom prst="rect">
             <a:avLst/>
@@ -9644,7 +9830,7 @@
     </p:spTree>
     <p:extLst>
       <p:ext uri="{BB962C8B-B14F-4D97-AF65-F5344CB8AC3E}">
-        <p14:creationId xmlns:p14="http://schemas.microsoft.com/office/powerpoint/2010/main" val="1212484014"/>
+        <p14:creationId xmlns:p14="http://schemas.microsoft.com/office/powerpoint/2010/main" val="3277018044"/>
       </p:ext>
     </p:extLst>
   </p:cSld>

</xml_diff>